<commit_message>
Created several icons for the OS.
</commit_message>
<xml_diff>
--- a/extras/pptx/MPD OS Desktop Environment.pptx
+++ b/extras/pptx/MPD OS Desktop Environment.pptx
@@ -11,6 +11,7 @@
     <p:sldId id="258" r:id="rId6"/>
     <p:sldId id="259" r:id="rId7"/>
     <p:sldId id="260" r:id="rId8"/>
+    <p:sldId id="261" r:id="rId9"/>
   </p:sldIdLst>
   <p:sldSz cx="10080625" cy="5670550"/>
   <p:notesSz cx="7772400" cy="10058400"/>
@@ -2795,7 +2796,7 @@
         <p:spPr>
           <a:xfrm>
             <a:off x="504000" y="1326600"/>
-            <a:ext cx="9071640" cy="3288240"/>
+            <a:ext cx="9072000" cy="3288600"/>
           </a:xfrm>
           <a:prstGeom prst="rect">
             <a:avLst/>
@@ -2808,7 +2809,7 @@
           <a:p>
             <a:pPr marL="432000" indent="-324000">
               <a:spcBef>
-                <a:spcPts val="1414"/>
+                <a:spcPts val="1417"/>
               </a:spcBef>
               <a:buClr>
                 <a:srgbClr val="000000"/>
@@ -2818,12 +2819,12 @@
               <a:buChar char=""/>
             </a:pPr>
             <a:r>
-              <a:rPr b="0" lang="id-ID" sz="1800" spc="-1" strike="noStrike">
+              <a:rPr b="0" lang="id-ID" sz="3200" spc="-1" strike="noStrike">
                 <a:latin typeface="Arial"/>
               </a:rPr>
               <a:t>Click to edit the outline text format</a:t>
             </a:r>
-            <a:endParaRPr b="0" lang="id-ID" sz="1800" spc="-1" strike="noStrike">
+            <a:endParaRPr b="0" lang="id-ID" sz="3200" spc="-1" strike="noStrike">
               <a:latin typeface="Arial"/>
             </a:endParaRPr>
           </a:p>
@@ -2840,12 +2841,12 @@
               <a:buChar char=""/>
             </a:pPr>
             <a:r>
-              <a:rPr b="0" lang="id-ID" sz="1800" spc="-1" strike="noStrike">
+              <a:rPr b="0" lang="id-ID" sz="2800" spc="-1" strike="noStrike">
                 <a:latin typeface="Arial"/>
               </a:rPr>
               <a:t>Second Outline Level</a:t>
             </a:r>
-            <a:endParaRPr b="0" lang="id-ID" sz="1800" spc="-1" strike="noStrike">
+            <a:endParaRPr b="0" lang="id-ID" sz="2800" spc="-1" strike="noStrike">
               <a:latin typeface="Arial"/>
             </a:endParaRPr>
           </a:p>
@@ -2862,12 +2863,12 @@
               <a:buChar char=""/>
             </a:pPr>
             <a:r>
-              <a:rPr b="0" lang="id-ID" sz="1800" spc="-1" strike="noStrike">
+              <a:rPr b="0" lang="id-ID" sz="2400" spc="-1" strike="noStrike">
                 <a:latin typeface="Arial"/>
               </a:rPr>
               <a:t>Third Outline Level</a:t>
             </a:r>
-            <a:endParaRPr b="0" lang="id-ID" sz="1800" spc="-1" strike="noStrike">
+            <a:endParaRPr b="0" lang="id-ID" sz="2400" spc="-1" strike="noStrike">
               <a:latin typeface="Arial"/>
             </a:endParaRPr>
           </a:p>
@@ -2884,12 +2885,12 @@
               <a:buChar char=""/>
             </a:pPr>
             <a:r>
-              <a:rPr b="0" lang="id-ID" sz="1800" spc="-1" strike="noStrike">
+              <a:rPr b="0" lang="id-ID" sz="2000" spc="-1" strike="noStrike">
                 <a:latin typeface="Arial"/>
               </a:rPr>
               <a:t>Fourth Outline Level</a:t>
             </a:r>
-            <a:endParaRPr b="0" lang="id-ID" sz="1800" spc="-1" strike="noStrike">
+            <a:endParaRPr b="0" lang="id-ID" sz="2000" spc="-1" strike="noStrike">
               <a:latin typeface="Arial"/>
             </a:endParaRPr>
           </a:p>
@@ -2906,12 +2907,12 @@
               <a:buChar char=""/>
             </a:pPr>
             <a:r>
-              <a:rPr b="0" lang="id-ID" sz="1800" spc="-1" strike="noStrike">
+              <a:rPr b="0" lang="id-ID" sz="2000" spc="-1" strike="noStrike">
                 <a:latin typeface="Arial"/>
               </a:rPr>
               <a:t>Fifth Outline Level</a:t>
             </a:r>
-            <a:endParaRPr b="0" lang="id-ID" sz="1800" spc="-1" strike="noStrike">
+            <a:endParaRPr b="0" lang="id-ID" sz="2000" spc="-1" strike="noStrike">
               <a:latin typeface="Arial"/>
             </a:endParaRPr>
           </a:p>
@@ -2928,12 +2929,12 @@
               <a:buChar char=""/>
             </a:pPr>
             <a:r>
-              <a:rPr b="0" lang="id-ID" sz="1800" spc="-1" strike="noStrike">
+              <a:rPr b="0" lang="id-ID" sz="2000" spc="-1" strike="noStrike">
                 <a:latin typeface="Arial"/>
               </a:rPr>
               <a:t>Sixth Outline Level</a:t>
             </a:r>
-            <a:endParaRPr b="0" lang="id-ID" sz="1800" spc="-1" strike="noStrike">
+            <a:endParaRPr b="0" lang="id-ID" sz="2000" spc="-1" strike="noStrike">
               <a:latin typeface="Arial"/>
             </a:endParaRPr>
           </a:p>
@@ -2950,12 +2951,12 @@
               <a:buChar char=""/>
             </a:pPr>
             <a:r>
-              <a:rPr b="0" lang="id-ID" sz="1800" spc="-1" strike="noStrike">
+              <a:rPr b="0" lang="id-ID" sz="2000" spc="-1" strike="noStrike">
                 <a:latin typeface="Arial"/>
               </a:rPr>
               <a:t>Seventh Outline Level</a:t>
             </a:r>
-            <a:endParaRPr b="0" lang="id-ID" sz="1800" spc="-1" strike="noStrike">
+            <a:endParaRPr b="0" lang="id-ID" sz="2000" spc="-1" strike="noStrike">
               <a:latin typeface="Arial"/>
             </a:endParaRPr>
           </a:p>
@@ -3061,7 +3062,7 @@
           <a:p>
             <a:pPr marL="432000" indent="-324000">
               <a:spcBef>
-                <a:spcPts val="1414"/>
+                <a:spcPts val="1417"/>
               </a:spcBef>
               <a:buClr>
                 <a:srgbClr val="000000"/>
@@ -3268,7 +3269,7 @@
         <p:spPr>
           <a:xfrm>
             <a:off x="3105000" y="1260000"/>
-            <a:ext cx="3869280" cy="2072520"/>
+            <a:ext cx="3868560" cy="2071800"/>
           </a:xfrm>
           <a:prstGeom prst="rect">
             <a:avLst/>
@@ -3305,9 +3306,6 @@
               <a:t>7:30</a:t>
             </a:r>
             <a:endParaRPr b="0" lang="id-ID" sz="12800" spc="-1" strike="noStrike">
-              <a:solidFill>
-                <a:srgbClr val="ffffff"/>
-              </a:solidFill>
               <a:latin typeface="Arial"/>
             </a:endParaRPr>
           </a:p>
@@ -3322,7 +3320,7 @@
         <p:spPr>
           <a:xfrm>
             <a:off x="3510000" y="3420000"/>
-            <a:ext cx="3059280" cy="539280"/>
+            <a:ext cx="3058560" cy="538560"/>
           </a:xfrm>
           <a:prstGeom prst="rect">
             <a:avLst/>
@@ -3359,9 +3357,6 @@
               <a:t>Sunday, July 11</a:t>
             </a:r>
             <a:endParaRPr b="0" lang="id-ID" sz="2400" spc="-1" strike="noStrike">
-              <a:solidFill>
-                <a:srgbClr val="ffffff"/>
-              </a:solidFill>
               <a:latin typeface="Arial"/>
             </a:endParaRPr>
           </a:p>
@@ -3375,15 +3370,13 @@
         </p:nvSpPr>
         <p:spPr>
           <a:xfrm>
-            <a:off x="4446720" y="5131080"/>
-            <a:ext cx="1186920" cy="539280"/>
-          </a:xfrm>
-          <a:prstGeom prst="rect">
-            <a:avLst/>
-          </a:prstGeom>
-          <a:solidFill>
-            <a:srgbClr val="00b0f0"/>
-          </a:solidFill>
+            <a:off x="4590360" y="5239080"/>
+            <a:ext cx="899640" cy="412560"/>
+          </a:xfrm>
+          <a:prstGeom prst="rect">
+            <a:avLst/>
+          </a:prstGeom>
+          <a:noFill/>
           <a:ln w="0">
             <a:noFill/>
           </a:ln>
@@ -3405,7 +3398,7 @@
               </a:lnSpc>
             </a:pPr>
             <a:r>
-              <a:rPr b="0" i="1" lang="en-US" sz="2400" spc="-1" strike="noStrike">
+              <a:rPr b="0" i="1" lang="en-US" sz="1500" spc="-1" strike="noStrike">
                 <a:solidFill>
                   <a:srgbClr val="ffffff"/>
                 </a:solidFill>
@@ -3414,10 +3407,239 @@
               </a:rPr>
               <a:t>unlock</a:t>
             </a:r>
-            <a:endParaRPr b="0" lang="id-ID" sz="2400" spc="-1" strike="noStrike">
-              <a:solidFill>
-                <a:srgbClr val="ffffff"/>
-              </a:solidFill>
+            <a:endParaRPr b="0" lang="id-ID" sz="1500" spc="-1" strike="noStrike">
+              <a:latin typeface="Arial"/>
+            </a:endParaRPr>
+          </a:p>
+        </p:txBody>
+      </p:sp>
+      <p:sp>
+        <p:nvSpPr>
+          <p:cNvPr id="79" name=""/>
+          <p:cNvSpPr/>
+          <p:nvPr/>
+        </p:nvSpPr>
+        <p:spPr>
+          <a:xfrm>
+            <a:off x="9533880" y="5406840"/>
+            <a:ext cx="94680" cy="94680"/>
+          </a:xfrm>
+          <a:custGeom>
+            <a:avLst/>
+            <a:gdLst/>
+            <a:ahLst/>
+            <a:rect l="l" t="t" r="r" b="b"/>
+            <a:pathLst>
+              <a:path w="640" h="861">
+                <a:moveTo>
+                  <a:pt x="640" y="233"/>
+                </a:moveTo>
+                <a:lnTo>
+                  <a:pt x="221" y="293"/>
+                </a:lnTo>
+                <a:lnTo>
+                  <a:pt x="506" y="12"/>
+                </a:lnTo>
+                <a:lnTo>
+                  <a:pt x="367" y="0"/>
+                </a:lnTo>
+                <a:lnTo>
+                  <a:pt x="29" y="406"/>
+                </a:lnTo>
+                <a:lnTo>
+                  <a:pt x="431" y="347"/>
+                </a:lnTo>
+                <a:lnTo>
+                  <a:pt x="145" y="645"/>
+                </a:lnTo>
+                <a:lnTo>
+                  <a:pt x="99" y="520"/>
+                </a:lnTo>
+                <a:lnTo>
+                  <a:pt x="0" y="861"/>
+                </a:lnTo>
+                <a:lnTo>
+                  <a:pt x="326" y="765"/>
+                </a:lnTo>
+                <a:lnTo>
+                  <a:pt x="209" y="711"/>
+                </a:lnTo>
+                <a:lnTo>
+                  <a:pt x="640" y="233"/>
+                </a:lnTo>
+                <a:lnTo>
+                  <a:pt x="640" y="233"/>
+                </a:lnTo>
+                <a:close/>
+              </a:path>
+            </a:pathLst>
+          </a:custGeom>
+          <a:solidFill>
+            <a:srgbClr val="00ff58"/>
+          </a:solidFill>
+          <a:ln w="0">
+            <a:solidFill>
+              <a:srgbClr val="3465a4">
+                <a:alpha val="0"/>
+              </a:srgbClr>
+            </a:solidFill>
+          </a:ln>
+        </p:spPr>
+        <p:style>
+          <a:lnRef idx="0"/>
+          <a:fillRef idx="0"/>
+          <a:effectRef idx="0"/>
+          <a:fontRef idx="minor"/>
+        </p:style>
+      </p:sp>
+      <p:sp>
+        <p:nvSpPr>
+          <p:cNvPr id="80" name=""/>
+          <p:cNvSpPr/>
+          <p:nvPr/>
+        </p:nvSpPr>
+        <p:spPr>
+          <a:xfrm>
+            <a:off x="9571680" y="5358600"/>
+            <a:ext cx="375480" cy="190800"/>
+          </a:xfrm>
+          <a:prstGeom prst="rect">
+            <a:avLst/>
+          </a:prstGeom>
+          <a:noFill/>
+          <a:ln w="0">
+            <a:noFill/>
+          </a:ln>
+        </p:spPr>
+        <p:style>
+          <a:lnRef idx="0"/>
+          <a:fillRef idx="0"/>
+          <a:effectRef idx="0"/>
+          <a:fontRef idx="minor"/>
+        </p:style>
+        <p:txBody>
+          <a:bodyPr lIns="90000" rIns="90000" tIns="45000" bIns="45000">
+            <a:noAutofit/>
+          </a:bodyPr>
+          <a:p>
+            <a:pPr algn="r">
+              <a:lnSpc>
+                <a:spcPts val="802"/>
+              </a:lnSpc>
+            </a:pPr>
+            <a:r>
+              <a:rPr b="1" lang="en-US" sz="700" spc="-1" strike="noStrike">
+                <a:solidFill>
+                  <a:srgbClr val="ffffff"/>
+                </a:solidFill>
+                <a:latin typeface="Montserrat"/>
+                <a:ea typeface="DejaVu Sans"/>
+              </a:rPr>
+              <a:t>90%</a:t>
+            </a:r>
+            <a:endParaRPr b="0" lang="id-ID" sz="700" spc="-1" strike="noStrike">
+              <a:latin typeface="Arial"/>
+            </a:endParaRPr>
+          </a:p>
+        </p:txBody>
+      </p:sp>
+      <p:sp>
+        <p:nvSpPr>
+          <p:cNvPr id="81" name=""/>
+          <p:cNvSpPr/>
+          <p:nvPr/>
+        </p:nvSpPr>
+        <p:spPr>
+          <a:xfrm>
+            <a:off x="9218880" y="5358600"/>
+            <a:ext cx="331200" cy="325800"/>
+          </a:xfrm>
+          <a:prstGeom prst="rect">
+            <a:avLst/>
+          </a:prstGeom>
+          <a:noFill/>
+          <a:ln w="0">
+            <a:noFill/>
+          </a:ln>
+        </p:spPr>
+        <p:style>
+          <a:lnRef idx="0"/>
+          <a:fillRef idx="0"/>
+          <a:effectRef idx="0"/>
+          <a:fontRef idx="minor"/>
+        </p:style>
+        <p:txBody>
+          <a:bodyPr lIns="90000" rIns="90000" tIns="45000" bIns="45000">
+            <a:noAutofit/>
+          </a:bodyPr>
+          <a:p>
+            <a:pPr algn="r">
+              <a:lnSpc>
+                <a:spcPts val="933"/>
+              </a:lnSpc>
+            </a:pPr>
+            <a:r>
+              <a:rPr b="1" lang="en-US" sz="900" spc="-1" strike="noStrike">
+                <a:solidFill>
+                  <a:srgbClr val="ffffff"/>
+                </a:solidFill>
+                <a:latin typeface="Montserrat"/>
+                <a:ea typeface="DejaVu Sans"/>
+              </a:rPr>
+              <a:t>🕪</a:t>
+            </a:r>
+            <a:endParaRPr b="0" lang="id-ID" sz="900" spc="-1" strike="noStrike">
+              <a:latin typeface="Arial"/>
+            </a:endParaRPr>
+          </a:p>
+        </p:txBody>
+      </p:sp>
+      <p:sp>
+        <p:nvSpPr>
+          <p:cNvPr id="82" name=""/>
+          <p:cNvSpPr/>
+          <p:nvPr/>
+        </p:nvSpPr>
+        <p:spPr>
+          <a:xfrm>
+            <a:off x="9049680" y="5358960"/>
+            <a:ext cx="289440" cy="190800"/>
+          </a:xfrm>
+          <a:prstGeom prst="rect">
+            <a:avLst/>
+          </a:prstGeom>
+          <a:noFill/>
+          <a:ln w="0">
+            <a:noFill/>
+          </a:ln>
+        </p:spPr>
+        <p:style>
+          <a:lnRef idx="0"/>
+          <a:fillRef idx="0"/>
+          <a:effectRef idx="0"/>
+          <a:fontRef idx="minor"/>
+        </p:style>
+        <p:txBody>
+          <a:bodyPr lIns="90000" rIns="90000" tIns="45000" bIns="45000">
+            <a:noAutofit/>
+          </a:bodyPr>
+          <a:p>
+            <a:pPr algn="r">
+              <a:lnSpc>
+                <a:spcPts val="802"/>
+              </a:lnSpc>
+            </a:pPr>
+            <a:r>
+              <a:rPr b="1" lang="en-US" sz="700" spc="-1" strike="noStrike">
+                <a:solidFill>
+                  <a:srgbClr val="000000"/>
+                </a:solidFill>
+                <a:latin typeface="Montserrat"/>
+                <a:ea typeface="DejaVu Sans"/>
+              </a:rPr>
+              <a:t>📶</a:t>
+            </a:r>
+            <a:endParaRPr b="0" lang="id-ID" sz="700" spc="-1" strike="noStrike">
               <a:latin typeface="Arial"/>
             </a:endParaRPr>
           </a:p>
@@ -3467,14 +3689,14 @@
       </p:grpSpPr>
       <p:sp>
         <p:nvSpPr>
-          <p:cNvPr id="79" name=""/>
+          <p:cNvPr id="83" name=""/>
           <p:cNvSpPr/>
           <p:nvPr/>
         </p:nvSpPr>
         <p:spPr>
           <a:xfrm>
-            <a:off x="4320000" y="4344840"/>
-            <a:ext cx="1439280" cy="334440"/>
+            <a:off x="4320000" y="4722480"/>
+            <a:ext cx="1438560" cy="244080"/>
           </a:xfrm>
           <a:prstGeom prst="rect">
             <a:avLst/>
@@ -3499,7 +3721,7 @@
           <a:p>
             <a:pPr algn="ctr">
               <a:lnSpc>
-                <a:spcPts val="1928"/>
+                <a:spcPct val="100000"/>
               </a:lnSpc>
             </a:pPr>
             <a:r>
@@ -3530,14 +3752,14 @@
       </p:sp>
       <p:sp>
         <p:nvSpPr>
-          <p:cNvPr id="80" name=""/>
+          <p:cNvPr id="84" name=""/>
           <p:cNvSpPr/>
           <p:nvPr/>
         </p:nvSpPr>
         <p:spPr>
           <a:xfrm>
             <a:off x="4545000" y="3240000"/>
-            <a:ext cx="989280" cy="461520"/>
+            <a:ext cx="988560" cy="460800"/>
           </a:xfrm>
           <a:prstGeom prst="rect">
             <a:avLst/>
@@ -3574,24 +3796,21 @@
               <a:t>User</a:t>
             </a:r>
             <a:endParaRPr b="0" lang="id-ID" sz="2400" spc="-1" strike="noStrike">
-              <a:solidFill>
-                <a:srgbClr val="ffffff"/>
-              </a:solidFill>
-              <a:latin typeface="Arial"/>
-            </a:endParaRPr>
-          </a:p>
-        </p:txBody>
-      </p:sp>
-      <p:sp>
-        <p:nvSpPr>
-          <p:cNvPr id="81" name=""/>
+              <a:latin typeface="Arial"/>
+            </a:endParaRPr>
+          </a:p>
+        </p:txBody>
+      </p:sp>
+      <p:sp>
+        <p:nvSpPr>
+          <p:cNvPr id="85" name=""/>
           <p:cNvSpPr/>
           <p:nvPr/>
         </p:nvSpPr>
         <p:spPr>
           <a:xfrm>
             <a:off x="4140000" y="1440000"/>
-            <a:ext cx="1799280" cy="1799280"/>
+            <a:ext cx="1798560" cy="1798560"/>
           </a:xfrm>
           <a:prstGeom prst="smileyFace">
             <a:avLst>
@@ -3616,14 +3835,14 @@
       </p:sp>
       <p:sp>
         <p:nvSpPr>
-          <p:cNvPr id="82" name=""/>
+          <p:cNvPr id="86" name=""/>
           <p:cNvSpPr/>
           <p:nvPr/>
         </p:nvSpPr>
         <p:spPr>
           <a:xfrm>
             <a:off x="3996000" y="4140000"/>
-            <a:ext cx="359280" cy="359280"/>
+            <a:ext cx="358560" cy="358560"/>
           </a:xfrm>
           <a:prstGeom prst="ellipse">
             <a:avLst/>
@@ -3648,14 +3867,14 @@
       </p:sp>
       <p:sp>
         <p:nvSpPr>
-          <p:cNvPr id="83" name=""/>
+          <p:cNvPr id="87" name=""/>
           <p:cNvSpPr/>
           <p:nvPr/>
         </p:nvSpPr>
         <p:spPr>
           <a:xfrm>
             <a:off x="4176000" y="4140000"/>
-            <a:ext cx="1619280" cy="359280"/>
+            <a:ext cx="1618560" cy="358560"/>
           </a:xfrm>
           <a:prstGeom prst="rect">
             <a:avLst/>
@@ -3680,14 +3899,14 @@
       </p:sp>
       <p:sp>
         <p:nvSpPr>
-          <p:cNvPr id="84" name=""/>
+          <p:cNvPr id="88" name=""/>
           <p:cNvSpPr/>
           <p:nvPr/>
         </p:nvSpPr>
         <p:spPr>
           <a:xfrm>
             <a:off x="5580000" y="4140000"/>
-            <a:ext cx="395280" cy="359280"/>
+            <a:ext cx="394560" cy="358560"/>
           </a:xfrm>
           <a:prstGeom prst="ellipse">
             <a:avLst/>
@@ -3737,14 +3956,14 @@
       </p:sp>
       <p:sp>
         <p:nvSpPr>
-          <p:cNvPr id="85" name=""/>
+          <p:cNvPr id="89" name=""/>
           <p:cNvSpPr/>
           <p:nvPr/>
         </p:nvSpPr>
         <p:spPr>
           <a:xfrm>
             <a:off x="4032000" y="4140000"/>
-            <a:ext cx="1475280" cy="359280"/>
+            <a:ext cx="1474560" cy="358560"/>
           </a:xfrm>
           <a:prstGeom prst="rect">
             <a:avLst/>
@@ -3830,14 +4049,14 @@
       </p:grpSpPr>
       <p:sp>
         <p:nvSpPr>
-          <p:cNvPr id="86" name=""/>
+          <p:cNvPr id="90" name=""/>
           <p:cNvSpPr/>
           <p:nvPr/>
         </p:nvSpPr>
         <p:spPr>
           <a:xfrm>
             <a:off x="4545000" y="3240000"/>
-            <a:ext cx="989280" cy="461520"/>
+            <a:ext cx="988560" cy="460800"/>
           </a:xfrm>
           <a:prstGeom prst="rect">
             <a:avLst/>
@@ -3874,24 +4093,21 @@
               <a:t>User</a:t>
             </a:r>
             <a:endParaRPr b="0" lang="id-ID" sz="2400" spc="-1" strike="noStrike">
-              <a:solidFill>
-                <a:srgbClr val="ffffff"/>
-              </a:solidFill>
-              <a:latin typeface="Arial"/>
-            </a:endParaRPr>
-          </a:p>
-        </p:txBody>
-      </p:sp>
-      <p:sp>
-        <p:nvSpPr>
-          <p:cNvPr id="87" name=""/>
+              <a:latin typeface="Arial"/>
+            </a:endParaRPr>
+          </a:p>
+        </p:txBody>
+      </p:sp>
+      <p:sp>
+        <p:nvSpPr>
+          <p:cNvPr id="91" name=""/>
           <p:cNvSpPr/>
           <p:nvPr/>
         </p:nvSpPr>
         <p:spPr>
           <a:xfrm>
             <a:off x="4140000" y="1440000"/>
-            <a:ext cx="1799280" cy="1799280"/>
+            <a:ext cx="1798560" cy="1798560"/>
           </a:xfrm>
           <a:prstGeom prst="smileyFace">
             <a:avLst>
@@ -3916,14 +4132,14 @@
       </p:sp>
       <p:sp>
         <p:nvSpPr>
-          <p:cNvPr id="88" name=""/>
+          <p:cNvPr id="92" name=""/>
           <p:cNvSpPr/>
           <p:nvPr/>
         </p:nvSpPr>
         <p:spPr>
           <a:xfrm>
             <a:off x="3510000" y="4104000"/>
-            <a:ext cx="3059280" cy="579240"/>
+            <a:ext cx="3058560" cy="578520"/>
           </a:xfrm>
           <a:prstGeom prst="rect">
             <a:avLst/>
@@ -3960,9 +4176,6 @@
               <a:t>Scan your fingerprint, or use your face to unlock.</a:t>
             </a:r>
             <a:endParaRPr b="0" lang="id-ID" sz="900" spc="-1" strike="noStrike">
-              <a:solidFill>
-                <a:srgbClr val="dee6ef"/>
-              </a:solidFill>
               <a:latin typeface="Arial"/>
             </a:endParaRPr>
           </a:p>
@@ -3972,16 +4185,107 @@
   </p:cSld>
   <mc:AlternateContent>
     <mc:Choice Requires="p14">
-      <p:transition advTm="4000" p14:dur="150">
+      <p:transition advTm="3000" p14:dur="150">
         <p:fade/>
       </p:transition>
     </mc:Choice>
     <mc:Fallback>
-      <p:transition advTm="4000">
+      <p:transition advTm="3000">
         <p:fade/>
       </p:transition>
     </mc:Fallback>
   </mc:AlternateContent>
+  <p:timing>
+    <p:tnLst>
+      <p:par>
+        <p:cTn id="1" dur="indefinite" restart="never" nodeType="tmRoot">
+          <p:childTnLst>
+            <p:seq>
+              <p:cTn id="2" dur="indefinite" nodeType="mainSeq">
+                <p:childTnLst>
+                  <p:par>
+                    <p:cTn id="3" fill="hold">
+                      <p:stCondLst>
+                        <p:cond delay="0"/>
+                      </p:stCondLst>
+                      <p:childTnLst>
+                        <p:par>
+                          <p:cTn id="4" fill="hold">
+                            <p:stCondLst>
+                              <p:cond delay="0"/>
+                            </p:stCondLst>
+                            <p:childTnLst>
+                              <p:par>
+                                <p:cTn id="5" nodeType="withEffect" fill="hold" presetClass="entr" presetID="18" presetSubtype="12">
+                                  <p:stCondLst>
+                                    <p:cond delay="500"/>
+                                  </p:stCondLst>
+                                  <p:childTnLst>
+                                    <p:set>
+                                      <p:cBhvr>
+                                        <p:cTn id="6" dur="1" fill="hold">
+                                          <p:stCondLst>
+                                            <p:cond delay="0"/>
+                                          </p:stCondLst>
+                                        </p:cTn>
+                                        <p:tgtEl>
+                                          <p:spTgt spid="91"/>
+                                        </p:tgtEl>
+                                        <p:attrNameLst>
+                                          <p:attrName>style.visibility</p:attrName>
+                                        </p:attrNameLst>
+                                      </p:cBhvr>
+                                      <p:to>
+                                        <p:strVal val="visible"/>
+                                      </p:to>
+                                    </p:set>
+                                    <p:animEffect filter="strips(downRight)" transition="in">
+                                      <p:cBhvr additive="repl">
+                                        <p:cTn id="7" dur="500"/>
+                                        <p:tgtEl>
+                                          <p:spTgt spid="91"/>
+                                        </p:tgtEl>
+                                      </p:cBhvr>
+                                    </p:animEffect>
+                                    <p:audio>
+                                      <p:cMediaNode>
+                                        <p:cTn/>
+                                        <p:tgtEl>
+                                          <p:sndTgt r:embed="rId2" name="apert.wav"/>
+                                        </p:tgtEl>
+                                      </p:cMediaNode>
+                                    </p:audio>
+                                  </p:childTnLst>
+                                </p:cTn>
+                              </p:par>
+                            </p:childTnLst>
+                          </p:cTn>
+                        </p:par>
+                      </p:childTnLst>
+                    </p:cTn>
+                  </p:par>
+                </p:childTnLst>
+              </p:cTn>
+              <p:prevCondLst>
+                <p:cond evt="onPrev">
+                  <p:tgtEl>
+                    <p:sldTgt/>
+                  </p:tgtEl>
+                </p:cond>
+              </p:prevCondLst>
+              <p:nextCondLst>
+                <p:cond evt="onNext">
+                  <p:tgtEl>
+                    <p:sldTgt/>
+                  </p:tgtEl>
+                </p:cond>
+              </p:nextCondLst>
+            </p:seq>
+          </p:childTnLst>
+        </p:cTn>
+      </p:par>
+    </p:tnLst>
+  </p:timing>
 </p:sld>
 </file>
 
@@ -4012,64 +4316,14 @@
       </p:grpSpPr>
       <p:sp>
         <p:nvSpPr>
-          <p:cNvPr id="89" name=""/>
+          <p:cNvPr id="93" name=""/>
           <p:cNvSpPr/>
           <p:nvPr/>
         </p:nvSpPr>
         <p:spPr>
           <a:xfrm>
-            <a:off x="4903560" y="196200"/>
-            <a:ext cx="264960" cy="218520"/>
-          </a:xfrm>
-          <a:custGeom>
-            <a:avLst/>
-            <a:gdLst/>
-            <a:ahLst/>
-            <a:rect l="l" t="t" r="r" b="b"/>
-            <a:pathLst>
-              <a:path w="404" h="334">
-                <a:moveTo>
-                  <a:pt x="201" y="0"/>
-                </a:moveTo>
-                <a:lnTo>
-                  <a:pt x="403" y="333"/>
-                </a:lnTo>
-                <a:lnTo>
-                  <a:pt x="0" y="333"/>
-                </a:lnTo>
-                <a:lnTo>
-                  <a:pt x="201" y="0"/>
-                </a:lnTo>
-              </a:path>
-            </a:pathLst>
-          </a:custGeom>
-          <a:solidFill>
-            <a:srgbClr val="00b0f0"/>
-          </a:solidFill>
-          <a:ln w="6480">
-            <a:solidFill>
-              <a:srgbClr val="3465a4"/>
-            </a:solidFill>
-            <a:round/>
-          </a:ln>
-        </p:spPr>
-        <p:style>
-          <a:lnRef idx="0"/>
-          <a:fillRef idx="0"/>
-          <a:effectRef idx="0"/>
-          <a:fontRef idx="minor"/>
-        </p:style>
-      </p:sp>
-      <p:sp>
-        <p:nvSpPr>
-          <p:cNvPr id="90" name=""/>
-          <p:cNvSpPr/>
-          <p:nvPr/>
-        </p:nvSpPr>
-        <p:spPr>
-          <a:xfrm>
             <a:off x="0" y="0"/>
-            <a:ext cx="10079280" cy="179280"/>
+            <a:ext cx="10078560" cy="178560"/>
           </a:xfrm>
           <a:prstGeom prst="rect">
             <a:avLst/>
@@ -4096,7 +4350,7 @@
       </p:sp>
       <p:pic>
         <p:nvPicPr>
-          <p:cNvPr id="91" name="" descr=""/>
+          <p:cNvPr id="94" name="" descr=""/>
           <p:cNvPicPr/>
           <p:nvPr/>
         </p:nvPicPr>
@@ -4109,7 +4363,7 @@
         <p:spPr>
           <a:xfrm>
             <a:off x="116640" y="37440"/>
-            <a:ext cx="63000" cy="97920"/>
+            <a:ext cx="62280" cy="97200"/>
           </a:xfrm>
           <a:prstGeom prst="rect">
             <a:avLst/>
@@ -4121,14 +4375,14 @@
       </p:pic>
       <p:sp>
         <p:nvSpPr>
-          <p:cNvPr id="92" name=""/>
+          <p:cNvPr id="95" name=""/>
           <p:cNvSpPr/>
           <p:nvPr/>
         </p:nvSpPr>
         <p:spPr>
           <a:xfrm>
             <a:off x="211680" y="0"/>
-            <a:ext cx="629640" cy="191520"/>
+            <a:ext cx="628920" cy="190800"/>
           </a:xfrm>
           <a:prstGeom prst="rect">
             <a:avLst/>
@@ -4165,33 +4419,26 @@
               <a:t>Desktop</a:t>
             </a:r>
             <a:endParaRPr b="0" lang="id-ID" sz="700" spc="-1" strike="noStrike">
-              <a:solidFill>
-                <a:srgbClr val="ffffff"/>
-              </a:solidFill>
-              <a:latin typeface="Arial"/>
-            </a:endParaRPr>
-          </a:p>
-        </p:txBody>
-      </p:sp>
-      <p:sp>
-        <p:nvSpPr>
-          <p:cNvPr id="93" name=""/>
+              <a:latin typeface="Arial"/>
+            </a:endParaRPr>
+          </a:p>
+        </p:txBody>
+      </p:sp>
+      <p:sp>
+        <p:nvSpPr>
+          <p:cNvPr id="96" name=""/>
           <p:cNvSpPr/>
           <p:nvPr/>
         </p:nvSpPr>
         <p:spPr>
           <a:xfrm>
             <a:off x="4855320" y="-5400"/>
-            <a:ext cx="369000" cy="191520"/>
-          </a:xfrm>
-          <a:prstGeom prst="rect">
-            <a:avLst/>
-          </a:prstGeom>
-          <a:solidFill>
-            <a:srgbClr val="ffffff">
-              <a:alpha val="75000"/>
-            </a:srgbClr>
-          </a:solidFill>
+            <a:ext cx="368280" cy="190800"/>
+          </a:xfrm>
+          <a:prstGeom prst="rect">
+            <a:avLst/>
+          </a:prstGeom>
+          <a:noFill/>
           <a:ln w="0">
             <a:noFill/>
           </a:ln>
@@ -4230,14 +4477,14 @@
       </p:sp>
       <p:sp>
         <p:nvSpPr>
-          <p:cNvPr id="94" name=""/>
+          <p:cNvPr id="97" name=""/>
           <p:cNvSpPr/>
           <p:nvPr/>
         </p:nvSpPr>
         <p:spPr>
           <a:xfrm>
             <a:off x="9713880" y="42840"/>
-            <a:ext cx="95400" cy="95400"/>
+            <a:ext cx="94680" cy="94680"/>
           </a:xfrm>
           <a:custGeom>
             <a:avLst/>
@@ -4309,14 +4556,14 @@
       </p:sp>
       <p:sp>
         <p:nvSpPr>
-          <p:cNvPr id="95" name=""/>
+          <p:cNvPr id="98" name=""/>
           <p:cNvSpPr/>
           <p:nvPr/>
         </p:nvSpPr>
         <p:spPr>
           <a:xfrm>
             <a:off x="9751680" y="-5400"/>
-            <a:ext cx="376200" cy="191520"/>
+            <a:ext cx="375480" cy="190800"/>
           </a:xfrm>
           <a:prstGeom prst="rect">
             <a:avLst/>
@@ -4353,24 +4600,21 @@
               <a:t>90%</a:t>
             </a:r>
             <a:endParaRPr b="0" lang="id-ID" sz="700" spc="-1" strike="noStrike">
-              <a:solidFill>
-                <a:srgbClr val="ffffff"/>
-              </a:solidFill>
-              <a:latin typeface="Arial"/>
-            </a:endParaRPr>
-          </a:p>
-        </p:txBody>
-      </p:sp>
-      <p:sp>
-        <p:nvSpPr>
-          <p:cNvPr id="96" name=""/>
+              <a:latin typeface="Arial"/>
+            </a:endParaRPr>
+          </a:p>
+        </p:txBody>
+      </p:sp>
+      <p:sp>
+        <p:nvSpPr>
+          <p:cNvPr id="99" name=""/>
           <p:cNvSpPr/>
           <p:nvPr/>
         </p:nvSpPr>
         <p:spPr>
           <a:xfrm>
             <a:off x="9398880" y="-5400"/>
-            <a:ext cx="331920" cy="326520"/>
+            <a:ext cx="331200" cy="325800"/>
           </a:xfrm>
           <a:prstGeom prst="rect">
             <a:avLst/>
@@ -4407,24 +4651,21 @@
               <a:t>🕪</a:t>
             </a:r>
             <a:endParaRPr b="0" lang="id-ID" sz="900" spc="-1" strike="noStrike">
-              <a:solidFill>
-                <a:srgbClr val="ffffff"/>
-              </a:solidFill>
-              <a:latin typeface="Arial"/>
-            </a:endParaRPr>
-          </a:p>
-        </p:txBody>
-      </p:sp>
-      <p:sp>
-        <p:nvSpPr>
-          <p:cNvPr id="97" name=""/>
+              <a:latin typeface="Arial"/>
+            </a:endParaRPr>
+          </a:p>
+        </p:txBody>
+      </p:sp>
+      <p:sp>
+        <p:nvSpPr>
+          <p:cNvPr id="100" name=""/>
           <p:cNvSpPr/>
           <p:nvPr/>
         </p:nvSpPr>
         <p:spPr>
           <a:xfrm>
             <a:off x="9229680" y="-5040"/>
-            <a:ext cx="290160" cy="191520"/>
+            <a:ext cx="289440" cy="190800"/>
           </a:xfrm>
           <a:prstGeom prst="rect">
             <a:avLst/>
@@ -4468,14 +4709,14 @@
       </p:sp>
       <p:sp>
         <p:nvSpPr>
-          <p:cNvPr id="98" name=""/>
+          <p:cNvPr id="101" name=""/>
           <p:cNvSpPr/>
           <p:nvPr/>
         </p:nvSpPr>
         <p:spPr>
           <a:xfrm>
             <a:off x="4590360" y="5238000"/>
-            <a:ext cx="847440" cy="359280"/>
+            <a:ext cx="846720" cy="358560"/>
           </a:xfrm>
           <a:custGeom>
             <a:avLst/>
@@ -4531,14 +4772,14 @@
       </p:sp>
       <p:sp>
         <p:nvSpPr>
-          <p:cNvPr id="99" name=""/>
+          <p:cNvPr id="102" name=""/>
           <p:cNvSpPr/>
           <p:nvPr/>
         </p:nvSpPr>
         <p:spPr>
           <a:xfrm>
             <a:off x="4428000" y="5238000"/>
-            <a:ext cx="359640" cy="359640"/>
+            <a:ext cx="358920" cy="358920"/>
           </a:xfrm>
           <a:custGeom>
             <a:avLst/>
@@ -4634,14 +4875,14 @@
       </p:sp>
       <p:sp>
         <p:nvSpPr>
-          <p:cNvPr id="100" name=""/>
+          <p:cNvPr id="103" name=""/>
           <p:cNvSpPr/>
           <p:nvPr/>
         </p:nvSpPr>
         <p:spPr>
           <a:xfrm>
             <a:off x="5256360" y="5238360"/>
-            <a:ext cx="359640" cy="359640"/>
+            <a:ext cx="358920" cy="358920"/>
           </a:xfrm>
           <a:custGeom>
             <a:avLst/>
@@ -4737,14 +4978,14 @@
       </p:sp>
       <p:sp>
         <p:nvSpPr>
-          <p:cNvPr id="101" name=""/>
+          <p:cNvPr id="104" name=""/>
           <p:cNvSpPr/>
           <p:nvPr/>
         </p:nvSpPr>
         <p:spPr>
           <a:xfrm>
             <a:off x="4752000" y="5220360"/>
-            <a:ext cx="539280" cy="363960"/>
+            <a:ext cx="538560" cy="363240"/>
           </a:xfrm>
           <a:prstGeom prst="rect">
             <a:avLst/>
@@ -4788,229 +5029,14 @@
       </p:sp>
       <p:sp>
         <p:nvSpPr>
-          <p:cNvPr id="102" name=""/>
-          <p:cNvSpPr/>
-          <p:nvPr/>
-        </p:nvSpPr>
-        <p:spPr>
-          <a:xfrm>
-            <a:off x="3306240" y="298800"/>
-            <a:ext cx="3459960" cy="3459960"/>
-          </a:xfrm>
-          <a:prstGeom prst="rect">
-            <a:avLst/>
-          </a:prstGeom>
-          <a:gradFill rotWithShape="0">
-            <a:gsLst>
-              <a:gs pos="0">
-                <a:srgbClr val="00b0f0"/>
-              </a:gs>
-              <a:gs pos="50000">
-                <a:srgbClr val="00b0f0"/>
-              </a:gs>
-              <a:gs pos="100000">
-                <a:srgbClr val="00b0f0"/>
-              </a:gs>
-            </a:gsLst>
-            <a:lin ang="5400000"/>
-          </a:gradFill>
-          <a:ln w="6480">
-            <a:solidFill>
-              <a:srgbClr val="3465a4"/>
-            </a:solidFill>
-            <a:round/>
-          </a:ln>
-        </p:spPr>
-        <p:style>
-          <a:lnRef idx="0"/>
-          <a:fillRef idx="0"/>
-          <a:effectRef idx="0"/>
-          <a:fontRef idx="minor"/>
-        </p:style>
-      </p:sp>
-      <p:sp>
-        <p:nvSpPr>
-          <p:cNvPr id="103" name=""/>
-          <p:cNvSpPr/>
-          <p:nvPr/>
-        </p:nvSpPr>
-        <p:spPr>
-          <a:xfrm>
-            <a:off x="3340080" y="2984760"/>
-            <a:ext cx="1869840" cy="707760"/>
-          </a:xfrm>
-          <a:prstGeom prst="rect">
-            <a:avLst/>
-          </a:prstGeom>
-          <a:noFill/>
-          <a:ln w="0">
-            <a:noFill/>
-          </a:ln>
-        </p:spPr>
-        <p:style>
-          <a:lnRef idx="0"/>
-          <a:fillRef idx="0"/>
-          <a:effectRef idx="0"/>
-          <a:fontRef idx="minor"/>
-        </p:style>
-        <p:txBody>
-          <a:bodyPr lIns="90000" rIns="90000" tIns="45000" bIns="45000">
-            <a:noAutofit/>
-          </a:bodyPr>
-          <a:p>
-            <a:pPr>
-              <a:lnSpc>
-                <a:spcPct val="100000"/>
-              </a:lnSpc>
-            </a:pPr>
-            <a:r>
-              <a:rPr b="0" lang="en-US" sz="1500" spc="-1" strike="noStrike">
-                <a:solidFill>
-                  <a:srgbClr val="000000"/>
-                </a:solidFill>
-                <a:latin typeface="Montserrat"/>
-                <a:ea typeface="DejaVu Sans"/>
-              </a:rPr>
-              <a:t>Sunday</a:t>
-            </a:r>
-            <a:endParaRPr b="0" lang="id-ID" sz="1500" spc="-1" strike="noStrike">
-              <a:latin typeface="Arial"/>
-            </a:endParaRPr>
-          </a:p>
-          <a:p>
-            <a:pPr>
-              <a:lnSpc>
-                <a:spcPct val="100000"/>
-              </a:lnSpc>
-            </a:pPr>
-            <a:r>
-              <a:rPr b="1" lang="en-US" sz="2000" spc="-1" strike="noStrike">
-                <a:solidFill>
-                  <a:srgbClr val="000000"/>
-                </a:solidFill>
-                <a:latin typeface="Montserrat"/>
-                <a:ea typeface="DejaVu Sans"/>
-              </a:rPr>
-              <a:t>July 11, 2021</a:t>
-            </a:r>
-            <a:endParaRPr b="0" lang="id-ID" sz="2000" spc="-1" strike="noStrike">
-              <a:latin typeface="Arial"/>
-            </a:endParaRPr>
-          </a:p>
-        </p:txBody>
-      </p:sp>
-      <p:sp>
-        <p:nvSpPr>
-          <p:cNvPr id="104" name=""/>
-          <p:cNvSpPr/>
-          <p:nvPr/>
-        </p:nvSpPr>
-        <p:spPr>
-          <a:xfrm>
-            <a:off x="3468960" y="452160"/>
-            <a:ext cx="3116880" cy="595440"/>
-          </a:xfrm>
-          <a:prstGeom prst="rect">
-            <a:avLst/>
-          </a:prstGeom>
-          <a:solidFill>
-            <a:srgbClr val="008cbf"/>
-          </a:solidFill>
-          <a:ln w="6480">
-            <a:solidFill>
-              <a:srgbClr val="3465a4"/>
-            </a:solidFill>
-            <a:round/>
-          </a:ln>
-        </p:spPr>
-        <p:style>
-          <a:lnRef idx="0"/>
-          <a:fillRef idx="0"/>
-          <a:effectRef idx="0"/>
-          <a:fontRef idx="minor"/>
-        </p:style>
-      </p:sp>
-      <p:sp>
-        <p:nvSpPr>
           <p:cNvPr id="105" name=""/>
           <p:cNvSpPr/>
           <p:nvPr/>
         </p:nvSpPr>
         <p:spPr>
-          <a:xfrm>
-            <a:off x="3425400" y="434160"/>
-            <a:ext cx="3226320" cy="762120"/>
-          </a:xfrm>
-          <a:prstGeom prst="rect">
-            <a:avLst/>
-          </a:prstGeom>
-          <a:noFill/>
-          <a:ln w="0">
-            <a:noFill/>
-          </a:ln>
-        </p:spPr>
-        <p:style>
-          <a:lnRef idx="0"/>
-          <a:fillRef idx="0"/>
-          <a:effectRef idx="0"/>
-          <a:fontRef idx="minor"/>
-        </p:style>
-        <p:txBody>
-          <a:bodyPr lIns="90000" rIns="90000" tIns="45000" bIns="45000">
-            <a:noAutofit/>
-          </a:bodyPr>
-          <a:p>
-            <a:pPr>
-              <a:lnSpc>
-                <a:spcPct val="100000"/>
-              </a:lnSpc>
-            </a:pPr>
-            <a:r>
-              <a:rPr b="0" lang="en-US" sz="1200" spc="-1" strike="noStrike">
-                <a:solidFill>
-                  <a:srgbClr val="ffffff"/>
-                </a:solidFill>
-                <a:latin typeface="Montserrat"/>
-                <a:ea typeface="DejaVu Sans"/>
-              </a:rPr>
-              <a:t>Welcome to MPD OS Remastered!</a:t>
-            </a:r>
-            <a:endParaRPr b="0" lang="id-ID" sz="1200" spc="-1" strike="noStrike">
-              <a:latin typeface="Arial"/>
-            </a:endParaRPr>
-          </a:p>
-          <a:p>
-            <a:pPr>
-              <a:lnSpc>
-                <a:spcPct val="100000"/>
-              </a:lnSpc>
-            </a:pPr>
-            <a:r>
-              <a:rPr b="0" lang="en-US" sz="1200" spc="-1" strike="noStrike">
-                <a:solidFill>
-                  <a:srgbClr val="ffffff"/>
-                </a:solidFill>
-                <a:latin typeface="Montserrat"/>
-                <a:ea typeface="DejaVu Sans"/>
-              </a:rPr>
-              <a:t>Click the notification to learn more.</a:t>
-            </a:r>
-            <a:endParaRPr b="0" lang="id-ID" sz="1200" spc="-1" strike="noStrike">
-              <a:latin typeface="Arial"/>
-            </a:endParaRPr>
-          </a:p>
-        </p:txBody>
-      </p:sp>
-      <p:sp>
-        <p:nvSpPr>
-          <p:cNvPr id="106" name=""/>
-          <p:cNvSpPr/>
-          <p:nvPr/>
-        </p:nvSpPr>
-        <p:spPr>
           <a:xfrm rot="612000">
-            <a:off x="5254920" y="5279400"/>
-            <a:ext cx="283680" cy="262800"/>
+            <a:off x="5254920" y="5278680"/>
+            <a:ext cx="282960" cy="262080"/>
           </a:xfrm>
           <a:custGeom>
             <a:avLst/>
@@ -5092,14 +5118,14 @@
       </p:sp>
       <p:sp>
         <p:nvSpPr>
-          <p:cNvPr id="107" name=""/>
+          <p:cNvPr id="106" name=""/>
           <p:cNvSpPr/>
           <p:nvPr/>
         </p:nvSpPr>
         <p:spPr>
           <a:xfrm>
             <a:off x="4860000" y="5220000"/>
-            <a:ext cx="359280" cy="363960"/>
+            <a:ext cx="358560" cy="363240"/>
           </a:xfrm>
           <a:prstGeom prst="rect">
             <a:avLst/>
@@ -5143,14 +5169,14 @@
       </p:sp>
       <p:sp>
         <p:nvSpPr>
-          <p:cNvPr id="108" name=""/>
+          <p:cNvPr id="107" name=""/>
           <p:cNvSpPr/>
           <p:nvPr/>
         </p:nvSpPr>
         <p:spPr>
           <a:xfrm rot="597600">
-            <a:off x="4521600" y="5271480"/>
-            <a:ext cx="266040" cy="266040"/>
+            <a:off x="4520880" y="5271480"/>
+            <a:ext cx="265320" cy="265320"/>
           </a:xfrm>
           <a:prstGeom prst="smileyFace">
             <a:avLst>
@@ -5163,34 +5189,6 @@
           <a:ln cap="rnd" w="12600">
             <a:solidFill>
               <a:srgbClr val="ffffff"/>
-            </a:solidFill>
-            <a:round/>
-          </a:ln>
-        </p:spPr>
-        <p:style>
-          <a:lnRef idx="0"/>
-          <a:fillRef idx="0"/>
-          <a:effectRef idx="0"/>
-          <a:fontRef idx="minor"/>
-        </p:style>
-      </p:sp>
-      <p:sp>
-        <p:nvSpPr>
-          <p:cNvPr id="109" name=""/>
-          <p:cNvSpPr/>
-          <p:nvPr/>
-        </p:nvSpPr>
-        <p:spPr>
-          <a:xfrm>
-            <a:off x="4979880" y="298800"/>
-            <a:ext cx="110520" cy="0"/>
-          </a:xfrm>
-          <a:prstGeom prst="line">
-            <a:avLst/>
-          </a:prstGeom>
-          <a:ln w="10080">
-            <a:solidFill>
-              <a:srgbClr val="00b0f0"/>
             </a:solidFill>
             <a:round/>
           </a:ln>
@@ -5246,14 +5244,327 @@
       </p:grpSpPr>
       <p:sp>
         <p:nvSpPr>
+          <p:cNvPr id="108" name=""/>
+          <p:cNvSpPr/>
+          <p:nvPr/>
+        </p:nvSpPr>
+        <p:spPr>
+          <a:xfrm>
+            <a:off x="4903560" y="231840"/>
+            <a:ext cx="264240" cy="217800"/>
+          </a:xfrm>
+          <a:custGeom>
+            <a:avLst/>
+            <a:gdLst/>
+            <a:ahLst/>
+            <a:rect l="l" t="t" r="r" b="b"/>
+            <a:pathLst>
+              <a:path w="404" h="334">
+                <a:moveTo>
+                  <a:pt x="201" y="0"/>
+                </a:moveTo>
+                <a:lnTo>
+                  <a:pt x="403" y="333"/>
+                </a:lnTo>
+                <a:lnTo>
+                  <a:pt x="0" y="333"/>
+                </a:lnTo>
+                <a:lnTo>
+                  <a:pt x="201" y="0"/>
+                </a:lnTo>
+              </a:path>
+            </a:pathLst>
+          </a:custGeom>
+          <a:solidFill>
+            <a:srgbClr val="00b0f0"/>
+          </a:solidFill>
+          <a:ln w="6480">
+            <a:solidFill>
+              <a:srgbClr val="3465a4"/>
+            </a:solidFill>
+            <a:round/>
+          </a:ln>
+        </p:spPr>
+        <p:style>
+          <a:lnRef idx="0"/>
+          <a:fillRef idx="0"/>
+          <a:effectRef idx="0"/>
+          <a:fontRef idx="minor"/>
+        </p:style>
+      </p:sp>
+      <p:sp>
+        <p:nvSpPr>
+          <p:cNvPr id="109" name=""/>
+          <p:cNvSpPr/>
+          <p:nvPr/>
+        </p:nvSpPr>
+        <p:spPr>
+          <a:xfrm>
+            <a:off x="3306240" y="334800"/>
+            <a:ext cx="3459240" cy="3459240"/>
+          </a:xfrm>
+          <a:prstGeom prst="rect">
+            <a:avLst/>
+          </a:prstGeom>
+          <a:gradFill rotWithShape="0">
+            <a:gsLst>
+              <a:gs pos="0">
+                <a:srgbClr val="00b0f0"/>
+              </a:gs>
+              <a:gs pos="50000">
+                <a:srgbClr val="00b0f0"/>
+              </a:gs>
+              <a:gs pos="100000">
+                <a:srgbClr val="00b0f0"/>
+              </a:gs>
+            </a:gsLst>
+            <a:lin ang="5400000"/>
+          </a:gradFill>
+          <a:ln w="6480">
+            <a:solidFill>
+              <a:srgbClr val="3465a4"/>
+            </a:solidFill>
+            <a:round/>
+          </a:ln>
+        </p:spPr>
+        <p:style>
+          <a:lnRef idx="0"/>
+          <a:fillRef idx="0"/>
+          <a:effectRef idx="0"/>
+          <a:fontRef idx="minor"/>
+        </p:style>
+      </p:sp>
+      <p:sp>
+        <p:nvSpPr>
           <p:cNvPr id="110" name=""/>
           <p:cNvSpPr/>
           <p:nvPr/>
         </p:nvSpPr>
         <p:spPr>
           <a:xfrm>
+            <a:off x="3340080" y="3020760"/>
+            <a:ext cx="1869120" cy="707040"/>
+          </a:xfrm>
+          <a:prstGeom prst="rect">
+            <a:avLst/>
+          </a:prstGeom>
+          <a:noFill/>
+          <a:ln w="0">
+            <a:noFill/>
+          </a:ln>
+        </p:spPr>
+        <p:style>
+          <a:lnRef idx="0"/>
+          <a:fillRef idx="0"/>
+          <a:effectRef idx="0"/>
+          <a:fontRef idx="minor"/>
+        </p:style>
+        <p:txBody>
+          <a:bodyPr lIns="90000" rIns="90000" tIns="45000" bIns="45000">
+            <a:noAutofit/>
+          </a:bodyPr>
+          <a:p>
+            <a:pPr>
+              <a:lnSpc>
+                <a:spcPct val="100000"/>
+              </a:lnSpc>
+            </a:pPr>
+            <a:r>
+              <a:rPr b="0" lang="en-US" sz="1500" spc="-1" strike="noStrike">
+                <a:solidFill>
+                  <a:srgbClr val="000000"/>
+                </a:solidFill>
+                <a:latin typeface="Montserrat"/>
+                <a:ea typeface="DejaVu Sans"/>
+              </a:rPr>
+              <a:t>S</a:t>
+            </a:r>
+            <a:r>
+              <a:rPr b="0" lang="en-US" sz="1500" spc="-1" strike="noStrike">
+                <a:solidFill>
+                  <a:srgbClr val="000000"/>
+                </a:solidFill>
+                <a:latin typeface="Montserrat"/>
+                <a:ea typeface="DejaVu Sans"/>
+              </a:rPr>
+              <a:t>u</a:t>
+            </a:r>
+            <a:r>
+              <a:rPr b="0" lang="en-US" sz="1500" spc="-1" strike="noStrike">
+                <a:solidFill>
+                  <a:srgbClr val="000000"/>
+                </a:solidFill>
+                <a:latin typeface="Montserrat"/>
+                <a:ea typeface="DejaVu Sans"/>
+              </a:rPr>
+              <a:t>n</a:t>
+            </a:r>
+            <a:r>
+              <a:rPr b="0" lang="en-US" sz="1500" spc="-1" strike="noStrike">
+                <a:solidFill>
+                  <a:srgbClr val="000000"/>
+                </a:solidFill>
+                <a:latin typeface="Montserrat"/>
+                <a:ea typeface="DejaVu Sans"/>
+              </a:rPr>
+              <a:t>d</a:t>
+            </a:r>
+            <a:r>
+              <a:rPr b="0" lang="en-US" sz="1500" spc="-1" strike="noStrike">
+                <a:solidFill>
+                  <a:srgbClr val="000000"/>
+                </a:solidFill>
+                <a:latin typeface="Montserrat"/>
+                <a:ea typeface="DejaVu Sans"/>
+              </a:rPr>
+              <a:t>a</a:t>
+            </a:r>
+            <a:r>
+              <a:rPr b="0" lang="en-US" sz="1500" spc="-1" strike="noStrike">
+                <a:solidFill>
+                  <a:srgbClr val="000000"/>
+                </a:solidFill>
+                <a:latin typeface="Montserrat"/>
+                <a:ea typeface="DejaVu Sans"/>
+              </a:rPr>
+              <a:t>y</a:t>
+            </a:r>
+            <a:endParaRPr b="0" lang="id-ID" sz="1500" spc="-1" strike="noStrike">
+              <a:latin typeface="Arial"/>
+            </a:endParaRPr>
+          </a:p>
+          <a:p>
+            <a:pPr>
+              <a:lnSpc>
+                <a:spcPct val="100000"/>
+              </a:lnSpc>
+            </a:pPr>
+            <a:r>
+              <a:rPr b="1" lang="en-US" sz="2000" spc="-1" strike="noStrike">
+                <a:solidFill>
+                  <a:srgbClr val="000000"/>
+                </a:solidFill>
+                <a:latin typeface="Montserrat"/>
+                <a:ea typeface="DejaVu Sans"/>
+              </a:rPr>
+              <a:t>J</a:t>
+            </a:r>
+            <a:r>
+              <a:rPr b="1" lang="en-US" sz="2000" spc="-1" strike="noStrike">
+                <a:solidFill>
+                  <a:srgbClr val="000000"/>
+                </a:solidFill>
+                <a:latin typeface="Montserrat"/>
+                <a:ea typeface="DejaVu Sans"/>
+              </a:rPr>
+              <a:t>u</a:t>
+            </a:r>
+            <a:r>
+              <a:rPr b="1" lang="en-US" sz="2000" spc="-1" strike="noStrike">
+                <a:solidFill>
+                  <a:srgbClr val="000000"/>
+                </a:solidFill>
+                <a:latin typeface="Montserrat"/>
+                <a:ea typeface="DejaVu Sans"/>
+              </a:rPr>
+              <a:t>l</a:t>
+            </a:r>
+            <a:r>
+              <a:rPr b="1" lang="en-US" sz="2000" spc="-1" strike="noStrike">
+                <a:solidFill>
+                  <a:srgbClr val="000000"/>
+                </a:solidFill>
+                <a:latin typeface="Montserrat"/>
+                <a:ea typeface="DejaVu Sans"/>
+              </a:rPr>
+              <a:t>y </a:t>
+            </a:r>
+            <a:r>
+              <a:rPr b="1" lang="en-US" sz="2000" spc="-1" strike="noStrike">
+                <a:solidFill>
+                  <a:srgbClr val="000000"/>
+                </a:solidFill>
+                <a:latin typeface="Montserrat"/>
+                <a:ea typeface="DejaVu Sans"/>
+              </a:rPr>
+              <a:t>1</a:t>
+            </a:r>
+            <a:r>
+              <a:rPr b="1" lang="en-US" sz="2000" spc="-1" strike="noStrike">
+                <a:solidFill>
+                  <a:srgbClr val="000000"/>
+                </a:solidFill>
+                <a:latin typeface="Montserrat"/>
+                <a:ea typeface="DejaVu Sans"/>
+              </a:rPr>
+              <a:t>1</a:t>
+            </a:r>
+            <a:r>
+              <a:rPr b="1" lang="en-US" sz="2000" spc="-1" strike="noStrike">
+                <a:solidFill>
+                  <a:srgbClr val="000000"/>
+                </a:solidFill>
+                <a:latin typeface="Montserrat"/>
+                <a:ea typeface="DejaVu Sans"/>
+              </a:rPr>
+              <a:t>, </a:t>
+            </a:r>
+            <a:r>
+              <a:rPr b="1" lang="en-US" sz="2000" spc="-1" strike="noStrike">
+                <a:solidFill>
+                  <a:srgbClr val="000000"/>
+                </a:solidFill>
+                <a:latin typeface="Montserrat"/>
+                <a:ea typeface="DejaVu Sans"/>
+              </a:rPr>
+              <a:t>2</a:t>
+            </a:r>
+            <a:r>
+              <a:rPr b="1" lang="en-US" sz="2000" spc="-1" strike="noStrike">
+                <a:solidFill>
+                  <a:srgbClr val="000000"/>
+                </a:solidFill>
+                <a:latin typeface="Montserrat"/>
+                <a:ea typeface="DejaVu Sans"/>
+              </a:rPr>
+              <a:t>0</a:t>
+            </a:r>
+            <a:r>
+              <a:rPr b="1" lang="en-US" sz="2000" spc="-1" strike="noStrike">
+                <a:solidFill>
+                  <a:srgbClr val="000000"/>
+                </a:solidFill>
+                <a:latin typeface="Montserrat"/>
+                <a:ea typeface="DejaVu Sans"/>
+              </a:rPr>
+              <a:t>2</a:t>
+            </a:r>
+            <a:r>
+              <a:rPr b="1" lang="en-US" sz="2000" spc="-1" strike="noStrike">
+                <a:solidFill>
+                  <a:srgbClr val="000000"/>
+                </a:solidFill>
+                <a:latin typeface="Montserrat"/>
+                <a:ea typeface="DejaVu Sans"/>
+              </a:rPr>
+              <a:t>1</a:t>
+            </a:r>
+            <a:endParaRPr b="0" lang="id-ID" sz="2000" spc="-1" strike="noStrike">
+              <a:latin typeface="Arial"/>
+            </a:endParaRPr>
+          </a:p>
+        </p:txBody>
+      </p:sp>
+      <p:sp>
+        <p:nvSpPr>
+          <p:cNvPr id="111" name=""/>
+          <p:cNvSpPr/>
+          <p:nvPr/>
+        </p:nvSpPr>
+        <p:spPr>
+          <a:xfrm>
             <a:off x="0" y="0"/>
-            <a:ext cx="10079280" cy="179280"/>
+            <a:ext cx="10078560" cy="178560"/>
           </a:xfrm>
           <a:prstGeom prst="rect">
             <a:avLst/>
@@ -5280,7 +5591,7 @@
       </p:sp>
       <p:pic>
         <p:nvPicPr>
-          <p:cNvPr id="111" name="" descr=""/>
+          <p:cNvPr id="112" name="" descr=""/>
           <p:cNvPicPr/>
           <p:nvPr/>
         </p:nvPicPr>
@@ -5293,7 +5604,7 @@
         <p:spPr>
           <a:xfrm>
             <a:off x="116640" y="37440"/>
-            <a:ext cx="63000" cy="97920"/>
+            <a:ext cx="62280" cy="97200"/>
           </a:xfrm>
           <a:prstGeom prst="rect">
             <a:avLst/>
@@ -5305,14 +5616,14 @@
       </p:pic>
       <p:sp>
         <p:nvSpPr>
-          <p:cNvPr id="112" name=""/>
+          <p:cNvPr id="113" name=""/>
           <p:cNvSpPr/>
           <p:nvPr/>
         </p:nvSpPr>
         <p:spPr>
           <a:xfrm>
             <a:off x="211680" y="0"/>
-            <a:ext cx="629640" cy="191520"/>
+            <a:ext cx="628920" cy="190800"/>
           </a:xfrm>
           <a:prstGeom prst="rect">
             <a:avLst/>
@@ -5356,14 +5667,1093 @@
       </p:sp>
       <p:sp>
         <p:nvSpPr>
-          <p:cNvPr id="113" name=""/>
+          <p:cNvPr id="114" name=""/>
           <p:cNvSpPr/>
           <p:nvPr/>
         </p:nvSpPr>
         <p:spPr>
           <a:xfrm>
             <a:off x="4855320" y="-5400"/>
-            <a:ext cx="369000" cy="191520"/>
+            <a:ext cx="368280" cy="190800"/>
+          </a:xfrm>
+          <a:prstGeom prst="rect">
+            <a:avLst/>
+          </a:prstGeom>
+          <a:solidFill>
+            <a:srgbClr val="ffffff"/>
+          </a:solidFill>
+          <a:ln w="0">
+            <a:noFill/>
+          </a:ln>
+        </p:spPr>
+        <p:style>
+          <a:lnRef idx="0"/>
+          <a:fillRef idx="0"/>
+          <a:effectRef idx="0"/>
+          <a:fontRef idx="minor"/>
+        </p:style>
+        <p:txBody>
+          <a:bodyPr lIns="90000" rIns="90000" tIns="45000" bIns="45000">
+            <a:noAutofit/>
+          </a:bodyPr>
+          <a:p>
+            <a:pPr algn="ctr">
+              <a:lnSpc>
+                <a:spcPts val="802"/>
+              </a:lnSpc>
+            </a:pPr>
+            <a:r>
+              <a:rPr b="1" lang="en-US" sz="700" spc="-1" strike="noStrike">
+                <a:solidFill>
+                  <a:srgbClr val="000000"/>
+                </a:solidFill>
+                <a:latin typeface="Montserrat"/>
+                <a:ea typeface="DejaVu Sans"/>
+              </a:rPr>
+              <a:t>7:30</a:t>
+            </a:r>
+            <a:endParaRPr b="0" lang="id-ID" sz="700" spc="-1" strike="noStrike">
+              <a:solidFill>
+                <a:srgbClr val="000000"/>
+              </a:solidFill>
+              <a:latin typeface="Arial"/>
+            </a:endParaRPr>
+          </a:p>
+        </p:txBody>
+      </p:sp>
+      <p:sp>
+        <p:nvSpPr>
+          <p:cNvPr id="115" name=""/>
+          <p:cNvSpPr/>
+          <p:nvPr/>
+        </p:nvSpPr>
+        <p:spPr>
+          <a:xfrm>
+            <a:off x="9713880" y="42840"/>
+            <a:ext cx="94680" cy="94680"/>
+          </a:xfrm>
+          <a:custGeom>
+            <a:avLst/>
+            <a:gdLst/>
+            <a:ahLst/>
+            <a:rect l="l" t="t" r="r" b="b"/>
+            <a:pathLst>
+              <a:path w="640" h="861">
+                <a:moveTo>
+                  <a:pt x="640" y="233"/>
+                </a:moveTo>
+                <a:lnTo>
+                  <a:pt x="221" y="293"/>
+                </a:lnTo>
+                <a:lnTo>
+                  <a:pt x="506" y="12"/>
+                </a:lnTo>
+                <a:lnTo>
+                  <a:pt x="367" y="0"/>
+                </a:lnTo>
+                <a:lnTo>
+                  <a:pt x="29" y="406"/>
+                </a:lnTo>
+                <a:lnTo>
+                  <a:pt x="431" y="347"/>
+                </a:lnTo>
+                <a:lnTo>
+                  <a:pt x="145" y="645"/>
+                </a:lnTo>
+                <a:lnTo>
+                  <a:pt x="99" y="520"/>
+                </a:lnTo>
+                <a:lnTo>
+                  <a:pt x="0" y="861"/>
+                </a:lnTo>
+                <a:lnTo>
+                  <a:pt x="326" y="765"/>
+                </a:lnTo>
+                <a:lnTo>
+                  <a:pt x="209" y="711"/>
+                </a:lnTo>
+                <a:lnTo>
+                  <a:pt x="640" y="233"/>
+                </a:lnTo>
+                <a:lnTo>
+                  <a:pt x="640" y="233"/>
+                </a:lnTo>
+                <a:close/>
+              </a:path>
+            </a:pathLst>
+          </a:custGeom>
+          <a:solidFill>
+            <a:srgbClr val="00a933"/>
+          </a:solidFill>
+          <a:ln w="0">
+            <a:solidFill>
+              <a:srgbClr val="3465a4">
+                <a:alpha val="0"/>
+              </a:srgbClr>
+            </a:solidFill>
+          </a:ln>
+        </p:spPr>
+        <p:style>
+          <a:lnRef idx="0"/>
+          <a:fillRef idx="0"/>
+          <a:effectRef idx="0"/>
+          <a:fontRef idx="minor"/>
+        </p:style>
+      </p:sp>
+      <p:sp>
+        <p:nvSpPr>
+          <p:cNvPr id="116" name=""/>
+          <p:cNvSpPr/>
+          <p:nvPr/>
+        </p:nvSpPr>
+        <p:spPr>
+          <a:xfrm>
+            <a:off x="9751680" y="-5400"/>
+            <a:ext cx="375480" cy="190800"/>
+          </a:xfrm>
+          <a:prstGeom prst="rect">
+            <a:avLst/>
+          </a:prstGeom>
+          <a:noFill/>
+          <a:ln w="0">
+            <a:noFill/>
+          </a:ln>
+        </p:spPr>
+        <p:style>
+          <a:lnRef idx="0"/>
+          <a:fillRef idx="0"/>
+          <a:effectRef idx="0"/>
+          <a:fontRef idx="minor"/>
+        </p:style>
+        <p:txBody>
+          <a:bodyPr lIns="90000" rIns="90000" tIns="45000" bIns="45000">
+            <a:noAutofit/>
+          </a:bodyPr>
+          <a:p>
+            <a:pPr algn="r">
+              <a:lnSpc>
+                <a:spcPts val="802"/>
+              </a:lnSpc>
+            </a:pPr>
+            <a:r>
+              <a:rPr b="1" lang="en-US" sz="700" spc="-1" strike="noStrike">
+                <a:solidFill>
+                  <a:srgbClr val="ffffff"/>
+                </a:solidFill>
+                <a:latin typeface="Montserrat"/>
+                <a:ea typeface="DejaVu Sans"/>
+              </a:rPr>
+              <a:t>9</a:t>
+            </a:r>
+            <a:r>
+              <a:rPr b="1" lang="en-US" sz="700" spc="-1" strike="noStrike">
+                <a:solidFill>
+                  <a:srgbClr val="ffffff"/>
+                </a:solidFill>
+                <a:latin typeface="Montserrat"/>
+                <a:ea typeface="DejaVu Sans"/>
+              </a:rPr>
+              <a:t>0</a:t>
+            </a:r>
+            <a:r>
+              <a:rPr b="1" lang="en-US" sz="700" spc="-1" strike="noStrike">
+                <a:solidFill>
+                  <a:srgbClr val="ffffff"/>
+                </a:solidFill>
+                <a:latin typeface="Montserrat"/>
+                <a:ea typeface="DejaVu Sans"/>
+              </a:rPr>
+              <a:t>%</a:t>
+            </a:r>
+            <a:endParaRPr b="0" lang="id-ID" sz="700" spc="-1" strike="noStrike">
+              <a:latin typeface="Arial"/>
+            </a:endParaRPr>
+          </a:p>
+        </p:txBody>
+      </p:sp>
+      <p:sp>
+        <p:nvSpPr>
+          <p:cNvPr id="117" name=""/>
+          <p:cNvSpPr/>
+          <p:nvPr/>
+        </p:nvSpPr>
+        <p:spPr>
+          <a:xfrm>
+            <a:off x="9395280" y="-5400"/>
+            <a:ext cx="334800" cy="325800"/>
+          </a:xfrm>
+          <a:prstGeom prst="rect">
+            <a:avLst/>
+          </a:prstGeom>
+          <a:noFill/>
+          <a:ln w="0">
+            <a:noFill/>
+          </a:ln>
+        </p:spPr>
+        <p:style>
+          <a:lnRef idx="0"/>
+          <a:fillRef idx="0"/>
+          <a:effectRef idx="0"/>
+          <a:fontRef idx="minor"/>
+        </p:style>
+        <p:txBody>
+          <a:bodyPr lIns="90000" rIns="90000" tIns="45000" bIns="45000">
+            <a:noAutofit/>
+          </a:bodyPr>
+          <a:p>
+            <a:pPr algn="r">
+              <a:lnSpc>
+                <a:spcPts val="933"/>
+              </a:lnSpc>
+            </a:pPr>
+            <a:r>
+              <a:rPr b="1" lang="en-US" sz="900" spc="-1" strike="noStrike">
+                <a:solidFill>
+                  <a:srgbClr val="000000"/>
+                </a:solidFill>
+                <a:latin typeface="Montserrat"/>
+                <a:ea typeface="DejaVu Sans"/>
+              </a:rPr>
+              <a:t>🕪</a:t>
+            </a:r>
+            <a:endParaRPr b="0" lang="id-ID" sz="900" spc="-1" strike="noStrike">
+              <a:latin typeface="Arial"/>
+            </a:endParaRPr>
+          </a:p>
+        </p:txBody>
+      </p:sp>
+      <p:sp>
+        <p:nvSpPr>
+          <p:cNvPr id="118" name=""/>
+          <p:cNvSpPr/>
+          <p:nvPr/>
+        </p:nvSpPr>
+        <p:spPr>
+          <a:xfrm>
+            <a:off x="9229680" y="-5040"/>
+            <a:ext cx="289440" cy="190800"/>
+          </a:xfrm>
+          <a:prstGeom prst="rect">
+            <a:avLst/>
+          </a:prstGeom>
+          <a:noFill/>
+          <a:ln w="0">
+            <a:noFill/>
+          </a:ln>
+        </p:spPr>
+        <p:style>
+          <a:lnRef idx="0"/>
+          <a:fillRef idx="0"/>
+          <a:effectRef idx="0"/>
+          <a:fontRef idx="minor"/>
+        </p:style>
+        <p:txBody>
+          <a:bodyPr lIns="90000" rIns="90000" tIns="45000" bIns="45000">
+            <a:noAutofit/>
+          </a:bodyPr>
+          <a:p>
+            <a:pPr algn="r">
+              <a:lnSpc>
+                <a:spcPts val="802"/>
+              </a:lnSpc>
+            </a:pPr>
+            <a:r>
+              <a:rPr b="1" lang="en-US" sz="700" spc="-1" strike="noStrike">
+                <a:solidFill>
+                  <a:srgbClr val="000000"/>
+                </a:solidFill>
+                <a:latin typeface="Montserrat"/>
+                <a:ea typeface="DejaVu Sans"/>
+              </a:rPr>
+              <a:t>📶</a:t>
+            </a:r>
+            <a:endParaRPr b="0" lang="id-ID" sz="700" spc="-1" strike="noStrike">
+              <a:latin typeface="Arial"/>
+            </a:endParaRPr>
+          </a:p>
+        </p:txBody>
+      </p:sp>
+      <p:sp>
+        <p:nvSpPr>
+          <p:cNvPr id="119" name=""/>
+          <p:cNvSpPr/>
+          <p:nvPr/>
+        </p:nvSpPr>
+        <p:spPr>
+          <a:xfrm>
+            <a:off x="3468960" y="487800"/>
+            <a:ext cx="3116160" cy="594720"/>
+          </a:xfrm>
+          <a:prstGeom prst="rect">
+            <a:avLst/>
+          </a:prstGeom>
+          <a:solidFill>
+            <a:srgbClr val="008cbf"/>
+          </a:solidFill>
+          <a:ln w="6480">
+            <a:solidFill>
+              <a:srgbClr val="3465a4"/>
+            </a:solidFill>
+            <a:round/>
+          </a:ln>
+        </p:spPr>
+        <p:style>
+          <a:lnRef idx="0"/>
+          <a:fillRef idx="0"/>
+          <a:effectRef idx="0"/>
+          <a:fontRef idx="minor"/>
+        </p:style>
+      </p:sp>
+      <p:sp>
+        <p:nvSpPr>
+          <p:cNvPr id="120" name=""/>
+          <p:cNvSpPr/>
+          <p:nvPr/>
+        </p:nvSpPr>
+        <p:spPr>
+          <a:xfrm>
+            <a:off x="3425400" y="469800"/>
+            <a:ext cx="3225600" cy="761400"/>
+          </a:xfrm>
+          <a:prstGeom prst="rect">
+            <a:avLst/>
+          </a:prstGeom>
+          <a:noFill/>
+          <a:ln w="0">
+            <a:noFill/>
+          </a:ln>
+        </p:spPr>
+        <p:style>
+          <a:lnRef idx="0"/>
+          <a:fillRef idx="0"/>
+          <a:effectRef idx="0"/>
+          <a:fontRef idx="minor"/>
+        </p:style>
+        <p:txBody>
+          <a:bodyPr lIns="90000" rIns="90000" tIns="45000" bIns="45000">
+            <a:noAutofit/>
+          </a:bodyPr>
+          <a:p>
+            <a:pPr>
+              <a:lnSpc>
+                <a:spcPct val="100000"/>
+              </a:lnSpc>
+            </a:pPr>
+            <a:r>
+              <a:rPr b="0" lang="en-US" sz="1200" spc="-1" strike="noStrike">
+                <a:solidFill>
+                  <a:srgbClr val="ffffff"/>
+                </a:solidFill>
+                <a:latin typeface="Montserrat"/>
+                <a:ea typeface="DejaVu Sans"/>
+              </a:rPr>
+              <a:t>Welcome to MPD OS Remastered!</a:t>
+            </a:r>
+            <a:endParaRPr b="0" lang="id-ID" sz="1200" spc="-1" strike="noStrike">
+              <a:latin typeface="Arial"/>
+            </a:endParaRPr>
+          </a:p>
+          <a:p>
+            <a:pPr>
+              <a:lnSpc>
+                <a:spcPct val="100000"/>
+              </a:lnSpc>
+            </a:pPr>
+            <a:r>
+              <a:rPr b="0" lang="en-US" sz="1200" spc="-1" strike="noStrike">
+                <a:solidFill>
+                  <a:srgbClr val="ffffff"/>
+                </a:solidFill>
+                <a:latin typeface="Montserrat"/>
+                <a:ea typeface="DejaVu Sans"/>
+              </a:rPr>
+              <a:t>Click the notification to learn more.</a:t>
+            </a:r>
+            <a:endParaRPr b="0" lang="id-ID" sz="1200" spc="-1" strike="noStrike">
+              <a:latin typeface="Arial"/>
+            </a:endParaRPr>
+          </a:p>
+        </p:txBody>
+      </p:sp>
+      <p:sp>
+        <p:nvSpPr>
+          <p:cNvPr id="121" name=""/>
+          <p:cNvSpPr/>
+          <p:nvPr/>
+        </p:nvSpPr>
+        <p:spPr>
+          <a:xfrm>
+            <a:off x="4979880" y="334440"/>
+            <a:ext cx="110520" cy="360"/>
+          </a:xfrm>
+          <a:prstGeom prst="line">
+            <a:avLst/>
+          </a:prstGeom>
+          <a:ln w="10080">
+            <a:solidFill>
+              <a:srgbClr val="00b0f0"/>
+            </a:solidFill>
+            <a:round/>
+          </a:ln>
+        </p:spPr>
+        <p:style>
+          <a:lnRef idx="0"/>
+          <a:fillRef idx="0"/>
+          <a:effectRef idx="0"/>
+          <a:fontRef idx="minor"/>
+        </p:style>
+      </p:sp>
+      <p:sp>
+        <p:nvSpPr>
+          <p:cNvPr id="122" name=""/>
+          <p:cNvSpPr/>
+          <p:nvPr/>
+        </p:nvSpPr>
+        <p:spPr>
+          <a:xfrm>
+            <a:off x="4590000" y="5238000"/>
+            <a:ext cx="846720" cy="358560"/>
+          </a:xfrm>
+          <a:custGeom>
+            <a:avLst/>
+            <a:gdLst/>
+            <a:ahLst/>
+            <a:rect l="l" t="t" r="r" b="b"/>
+            <a:pathLst>
+              <a:path w="2357" h="1001">
+                <a:moveTo>
+                  <a:pt x="0" y="1000"/>
+                </a:moveTo>
+                <a:cubicBezTo>
+                  <a:pt x="0" y="667"/>
+                  <a:pt x="0" y="333"/>
+                  <a:pt x="0" y="0"/>
+                </a:cubicBezTo>
+                <a:cubicBezTo>
+                  <a:pt x="785" y="0"/>
+                  <a:pt x="1571" y="0"/>
+                  <a:pt x="2356" y="0"/>
+                </a:cubicBezTo>
+                <a:cubicBezTo>
+                  <a:pt x="2356" y="333"/>
+                  <a:pt x="2356" y="667"/>
+                  <a:pt x="2356" y="1000"/>
+                </a:cubicBezTo>
+                <a:cubicBezTo>
+                  <a:pt x="1571" y="1000"/>
+                  <a:pt x="785" y="1000"/>
+                  <a:pt x="0" y="1000"/>
+                </a:cubicBezTo>
+                <a:close/>
+              </a:path>
+            </a:pathLst>
+          </a:custGeom>
+          <a:solidFill>
+            <a:srgbClr val="2ba5d2"/>
+          </a:solidFill>
+          <a:ln w="0">
+            <a:solidFill>
+              <a:srgbClr val="3465a4">
+                <a:alpha val="0"/>
+              </a:srgbClr>
+            </a:solidFill>
+          </a:ln>
+        </p:spPr>
+        <p:style>
+          <a:lnRef idx="0"/>
+          <a:fillRef idx="0"/>
+          <a:effectRef idx="0"/>
+          <a:fontRef idx="minor"/>
+        </p:style>
+      </p:sp>
+      <p:sp>
+        <p:nvSpPr>
+          <p:cNvPr id="123" name=""/>
+          <p:cNvSpPr/>
+          <p:nvPr/>
+        </p:nvSpPr>
+        <p:spPr>
+          <a:xfrm>
+            <a:off x="4427640" y="5238000"/>
+            <a:ext cx="358920" cy="358920"/>
+          </a:xfrm>
+          <a:custGeom>
+            <a:avLst/>
+            <a:gdLst/>
+            <a:ahLst/>
+            <a:rect l="l" t="t" r="r" b="b"/>
+            <a:pathLst>
+              <a:path w="1002" h="1002">
+                <a:moveTo>
+                  <a:pt x="1001" y="501"/>
+                </a:moveTo>
+                <a:cubicBezTo>
+                  <a:pt x="1001" y="588"/>
+                  <a:pt x="978" y="675"/>
+                  <a:pt x="934" y="751"/>
+                </a:cubicBezTo>
+                <a:cubicBezTo>
+                  <a:pt x="890" y="827"/>
+                  <a:pt x="827" y="890"/>
+                  <a:pt x="751" y="934"/>
+                </a:cubicBezTo>
+                <a:cubicBezTo>
+                  <a:pt x="675" y="978"/>
+                  <a:pt x="588" y="1001"/>
+                  <a:pt x="501" y="1001"/>
+                </a:cubicBezTo>
+                <a:cubicBezTo>
+                  <a:pt x="413" y="1001"/>
+                  <a:pt x="326" y="978"/>
+                  <a:pt x="250" y="934"/>
+                </a:cubicBezTo>
+                <a:cubicBezTo>
+                  <a:pt x="174" y="890"/>
+                  <a:pt x="111" y="827"/>
+                  <a:pt x="67" y="751"/>
+                </a:cubicBezTo>
+                <a:cubicBezTo>
+                  <a:pt x="23" y="675"/>
+                  <a:pt x="0" y="588"/>
+                  <a:pt x="0" y="501"/>
+                </a:cubicBezTo>
+                <a:cubicBezTo>
+                  <a:pt x="0" y="413"/>
+                  <a:pt x="23" y="326"/>
+                  <a:pt x="67" y="250"/>
+                </a:cubicBezTo>
+                <a:cubicBezTo>
+                  <a:pt x="111" y="174"/>
+                  <a:pt x="174" y="111"/>
+                  <a:pt x="250" y="67"/>
+                </a:cubicBezTo>
+                <a:cubicBezTo>
+                  <a:pt x="326" y="23"/>
+                  <a:pt x="413" y="0"/>
+                  <a:pt x="501" y="0"/>
+                </a:cubicBezTo>
+                <a:cubicBezTo>
+                  <a:pt x="588" y="0"/>
+                  <a:pt x="675" y="23"/>
+                  <a:pt x="751" y="67"/>
+                </a:cubicBezTo>
+                <a:cubicBezTo>
+                  <a:pt x="827" y="111"/>
+                  <a:pt x="890" y="174"/>
+                  <a:pt x="934" y="250"/>
+                </a:cubicBezTo>
+                <a:cubicBezTo>
+                  <a:pt x="978" y="326"/>
+                  <a:pt x="1001" y="413"/>
+                  <a:pt x="1001" y="501"/>
+                </a:cubicBezTo>
+                <a:close/>
+              </a:path>
+            </a:pathLst>
+          </a:custGeom>
+          <a:solidFill>
+            <a:srgbClr val="2ba5d2"/>
+          </a:solidFill>
+          <a:ln w="0">
+            <a:solidFill>
+              <a:srgbClr val="3465a4">
+                <a:alpha val="10000"/>
+              </a:srgbClr>
+            </a:solidFill>
+          </a:ln>
+        </p:spPr>
+        <p:style>
+          <a:lnRef idx="0"/>
+          <a:fillRef idx="0"/>
+          <a:effectRef idx="0"/>
+          <a:fontRef idx="minor"/>
+        </p:style>
+      </p:sp>
+      <p:sp>
+        <p:nvSpPr>
+          <p:cNvPr id="124" name=""/>
+          <p:cNvSpPr/>
+          <p:nvPr/>
+        </p:nvSpPr>
+        <p:spPr>
+          <a:xfrm>
+            <a:off x="5256000" y="5238360"/>
+            <a:ext cx="358920" cy="358920"/>
+          </a:xfrm>
+          <a:custGeom>
+            <a:avLst/>
+            <a:gdLst/>
+            <a:ahLst/>
+            <a:rect l="l" t="t" r="r" b="b"/>
+            <a:pathLst>
+              <a:path w="1002" h="1002">
+                <a:moveTo>
+                  <a:pt x="1001" y="501"/>
+                </a:moveTo>
+                <a:cubicBezTo>
+                  <a:pt x="1001" y="588"/>
+                  <a:pt x="978" y="675"/>
+                  <a:pt x="934" y="751"/>
+                </a:cubicBezTo>
+                <a:cubicBezTo>
+                  <a:pt x="890" y="827"/>
+                  <a:pt x="827" y="890"/>
+                  <a:pt x="751" y="934"/>
+                </a:cubicBezTo>
+                <a:cubicBezTo>
+                  <a:pt x="675" y="978"/>
+                  <a:pt x="588" y="1001"/>
+                  <a:pt x="501" y="1001"/>
+                </a:cubicBezTo>
+                <a:cubicBezTo>
+                  <a:pt x="413" y="1001"/>
+                  <a:pt x="326" y="978"/>
+                  <a:pt x="250" y="934"/>
+                </a:cubicBezTo>
+                <a:cubicBezTo>
+                  <a:pt x="174" y="890"/>
+                  <a:pt x="111" y="827"/>
+                  <a:pt x="67" y="751"/>
+                </a:cubicBezTo>
+                <a:cubicBezTo>
+                  <a:pt x="23" y="675"/>
+                  <a:pt x="0" y="588"/>
+                  <a:pt x="0" y="501"/>
+                </a:cubicBezTo>
+                <a:cubicBezTo>
+                  <a:pt x="0" y="413"/>
+                  <a:pt x="23" y="326"/>
+                  <a:pt x="67" y="250"/>
+                </a:cubicBezTo>
+                <a:cubicBezTo>
+                  <a:pt x="111" y="174"/>
+                  <a:pt x="174" y="111"/>
+                  <a:pt x="250" y="67"/>
+                </a:cubicBezTo>
+                <a:cubicBezTo>
+                  <a:pt x="326" y="23"/>
+                  <a:pt x="413" y="0"/>
+                  <a:pt x="501" y="0"/>
+                </a:cubicBezTo>
+                <a:cubicBezTo>
+                  <a:pt x="588" y="0"/>
+                  <a:pt x="675" y="23"/>
+                  <a:pt x="751" y="67"/>
+                </a:cubicBezTo>
+                <a:cubicBezTo>
+                  <a:pt x="827" y="111"/>
+                  <a:pt x="890" y="174"/>
+                  <a:pt x="934" y="250"/>
+                </a:cubicBezTo>
+                <a:cubicBezTo>
+                  <a:pt x="978" y="326"/>
+                  <a:pt x="1001" y="413"/>
+                  <a:pt x="1001" y="501"/>
+                </a:cubicBezTo>
+                <a:close/>
+              </a:path>
+            </a:pathLst>
+          </a:custGeom>
+          <a:solidFill>
+            <a:srgbClr val="2ba5d2"/>
+          </a:solidFill>
+          <a:ln w="0">
+            <a:solidFill>
+              <a:srgbClr val="3465a4">
+                <a:alpha val="10000"/>
+              </a:srgbClr>
+            </a:solidFill>
+          </a:ln>
+        </p:spPr>
+        <p:style>
+          <a:lnRef idx="0"/>
+          <a:fillRef idx="0"/>
+          <a:effectRef idx="0"/>
+          <a:fontRef idx="minor"/>
+        </p:style>
+      </p:sp>
+      <p:sp>
+        <p:nvSpPr>
+          <p:cNvPr id="125" name=""/>
+          <p:cNvSpPr/>
+          <p:nvPr/>
+        </p:nvSpPr>
+        <p:spPr>
+          <a:xfrm>
+            <a:off x="4751640" y="5220360"/>
+            <a:ext cx="538560" cy="363240"/>
+          </a:xfrm>
+          <a:prstGeom prst="rect">
+            <a:avLst/>
+          </a:prstGeom>
+          <a:noFill/>
+          <a:ln w="0">
+            <a:noFill/>
+          </a:ln>
+        </p:spPr>
+        <p:style>
+          <a:lnRef idx="0"/>
+          <a:fillRef idx="0"/>
+          <a:effectRef idx="0"/>
+          <a:fontRef idx="minor"/>
+        </p:style>
+        <p:txBody>
+          <a:bodyPr lIns="90000" rIns="90000" tIns="45000" bIns="45000">
+            <a:noAutofit/>
+          </a:bodyPr>
+          <a:p>
+            <a:pPr algn="ctr">
+              <a:lnSpc>
+                <a:spcPct val="100000"/>
+              </a:lnSpc>
+            </a:pPr>
+            <a:r>
+              <a:rPr b="0" lang="en-US" sz="1800" spc="-1" strike="noStrike">
+                <a:solidFill>
+                  <a:srgbClr val="000000"/>
+                </a:solidFill>
+                <a:latin typeface="Cantarell"/>
+                <a:ea typeface="DejaVu Sans"/>
+              </a:rPr>
+              <a:t>⬛</a:t>
+            </a:r>
+            <a:endParaRPr b="0" lang="id-ID" sz="1800" spc="-1" strike="noStrike">
+              <a:latin typeface="Arial"/>
+            </a:endParaRPr>
+          </a:p>
+        </p:txBody>
+      </p:sp>
+      <p:sp>
+        <p:nvSpPr>
+          <p:cNvPr id="126" name=""/>
+          <p:cNvSpPr/>
+          <p:nvPr/>
+        </p:nvSpPr>
+        <p:spPr>
+          <a:xfrm rot="612000">
+            <a:off x="5254560" y="5278680"/>
+            <a:ext cx="282960" cy="262080"/>
+          </a:xfrm>
+          <a:custGeom>
+            <a:avLst/>
+            <a:gdLst/>
+            <a:ahLst/>
+            <a:rect l="l" t="t" r="r" b="b"/>
+            <a:pathLst>
+              <a:path w="792" h="733">
+                <a:moveTo>
+                  <a:pt x="0" y="365"/>
+                </a:moveTo>
+                <a:lnTo>
+                  <a:pt x="113" y="471"/>
+                </a:lnTo>
+                <a:lnTo>
+                  <a:pt x="115" y="624"/>
+                </a:lnTo>
+                <a:lnTo>
+                  <a:pt x="276" y="625"/>
+                </a:lnTo>
+                <a:lnTo>
+                  <a:pt x="395" y="732"/>
+                </a:lnTo>
+                <a:lnTo>
+                  <a:pt x="509" y="626"/>
+                </a:lnTo>
+                <a:lnTo>
+                  <a:pt x="675" y="624"/>
+                </a:lnTo>
+                <a:lnTo>
+                  <a:pt x="675" y="476"/>
+                </a:lnTo>
+                <a:lnTo>
+                  <a:pt x="791" y="365"/>
+                </a:lnTo>
+                <a:lnTo>
+                  <a:pt x="677" y="260"/>
+                </a:lnTo>
+                <a:lnTo>
+                  <a:pt x="674" y="107"/>
+                </a:lnTo>
+                <a:lnTo>
+                  <a:pt x="514" y="106"/>
+                </a:lnTo>
+                <a:lnTo>
+                  <a:pt x="395" y="0"/>
+                </a:lnTo>
+                <a:lnTo>
+                  <a:pt x="281" y="104"/>
+                </a:lnTo>
+                <a:lnTo>
+                  <a:pt x="115" y="107"/>
+                </a:lnTo>
+                <a:lnTo>
+                  <a:pt x="115" y="255"/>
+                </a:lnTo>
+                <a:lnTo>
+                  <a:pt x="0" y="365"/>
+                </a:lnTo>
+              </a:path>
+            </a:pathLst>
+          </a:custGeom>
+          <a:solidFill>
+            <a:srgbClr val="ffbf00"/>
+          </a:solidFill>
+          <a:ln w="12600">
+            <a:solidFill>
+              <a:srgbClr val="ffff00"/>
+            </a:solidFill>
+            <a:round/>
+          </a:ln>
+        </p:spPr>
+        <p:style>
+          <a:lnRef idx="0"/>
+          <a:fillRef idx="0"/>
+          <a:effectRef idx="0"/>
+          <a:fontRef idx="minor"/>
+        </p:style>
+      </p:sp>
+      <p:sp>
+        <p:nvSpPr>
+          <p:cNvPr id="127" name=""/>
+          <p:cNvSpPr/>
+          <p:nvPr/>
+        </p:nvSpPr>
+        <p:spPr>
+          <a:xfrm>
+            <a:off x="4859640" y="5220000"/>
+            <a:ext cx="358560" cy="363240"/>
+          </a:xfrm>
+          <a:prstGeom prst="rect">
+            <a:avLst/>
+          </a:prstGeom>
+          <a:noFill/>
+          <a:ln w="0">
+            <a:noFill/>
+          </a:ln>
+        </p:spPr>
+        <p:style>
+          <a:lnRef idx="0"/>
+          <a:fillRef idx="0"/>
+          <a:effectRef idx="0"/>
+          <a:fontRef idx="minor"/>
+        </p:style>
+        <p:txBody>
+          <a:bodyPr lIns="90000" rIns="90000" tIns="45000" bIns="45000">
+            <a:noAutofit/>
+          </a:bodyPr>
+          <a:p>
+            <a:pPr>
+              <a:lnSpc>
+                <a:spcPct val="100000"/>
+              </a:lnSpc>
+            </a:pPr>
+            <a:r>
+              <a:rPr b="0" lang="en-US" sz="1800" spc="-1" strike="noStrike">
+                <a:solidFill>
+                  <a:srgbClr val="ffffff"/>
+                </a:solidFill>
+                <a:latin typeface="Cantarell"/>
+                <a:ea typeface="DejaVu Sans"/>
+              </a:rPr>
+              <a:t>↑</a:t>
+            </a:r>
+            <a:endParaRPr b="0" lang="id-ID" sz="1800" spc="-1" strike="noStrike">
+              <a:latin typeface="Arial"/>
+            </a:endParaRPr>
+          </a:p>
+        </p:txBody>
+      </p:sp>
+      <p:sp>
+        <p:nvSpPr>
+          <p:cNvPr id="128" name=""/>
+          <p:cNvSpPr/>
+          <p:nvPr/>
+        </p:nvSpPr>
+        <p:spPr>
+          <a:xfrm rot="597600">
+            <a:off x="4520520" y="5271480"/>
+            <a:ext cx="265320" cy="265320"/>
+          </a:xfrm>
+          <a:prstGeom prst="smileyFace">
+            <a:avLst>
+              <a:gd name="adj" fmla="val 9282"/>
+            </a:avLst>
+          </a:prstGeom>
+          <a:solidFill>
+            <a:srgbClr val="006eff"/>
+          </a:solidFill>
+          <a:ln cap="rnd" w="12600">
+            <a:solidFill>
+              <a:srgbClr val="ffffff"/>
+            </a:solidFill>
+            <a:round/>
+          </a:ln>
+        </p:spPr>
+        <p:style>
+          <a:lnRef idx="0"/>
+          <a:fillRef idx="0"/>
+          <a:effectRef idx="0"/>
+          <a:fontRef idx="minor"/>
+        </p:style>
+      </p:sp>
+    </p:spTree>
+  </p:cSld>
+  <mc:AlternateContent>
+    <mc:Choice Requires="p14">
+      <p:transition spd="slow" p14:dur="2000"/>
+    </mc:Choice>
+    <mc:Fallback>
+      <p:transition spd="slow"/>
+    </mc:Fallback>
+  </mc:AlternateContent>
+</p:sld>
+</file>
+
+<file path=ppt/slides/slide6.xml><?xml version="1.0" encoding="utf-8"?>
+<p:sld xmlns:a="http://schemas.openxmlformats.org/drawingml/2006/main" xmlns:p="http://schemas.openxmlformats.org/presentationml/2006/main" xmlns:r="http://schemas.openxmlformats.org/officeDocument/2006/relationships" xmlns:p14="http://schemas.microsoft.com/office/powerpoint/2010/main" xmlns:p15="http://schemas.microsoft.com/office/powerpoint/2012/main" xmlns:mc="http://schemas.openxmlformats.org/markup-compatibility/2006">
+  <p:cSld>
+    <p:bg>
+      <p:bgPr>
+        <a:blipFill rotWithShape="0">
+          <a:blip r:embed="rId1"/>
+          <a:stretch/>
+        </a:blipFill>
+      </p:bgPr>
+    </p:bg>
+    <p:spTree>
+      <p:nvGrpSpPr>
+        <p:cNvPr id="1" name=""/>
+        <p:cNvGrpSpPr/>
+        <p:nvPr/>
+      </p:nvGrpSpPr>
+      <p:grpSpPr>
+        <a:xfrm>
+          <a:off x="0" y="0"/>
+          <a:ext cx="0" cy="0"/>
+          <a:chOff x="0" y="0"/>
+          <a:chExt cx="0" cy="0"/>
+        </a:xfrm>
+      </p:grpSpPr>
+      <p:sp>
+        <p:nvSpPr>
+          <p:cNvPr id="129" name=""/>
+          <p:cNvSpPr/>
+          <p:nvPr/>
+        </p:nvSpPr>
+        <p:spPr>
+          <a:xfrm>
+            <a:off x="0" y="0"/>
+            <a:ext cx="10078560" cy="178560"/>
+          </a:xfrm>
+          <a:prstGeom prst="rect">
+            <a:avLst/>
+          </a:prstGeom>
+          <a:solidFill>
+            <a:srgbClr val="000000">
+              <a:alpha val="15000"/>
+            </a:srgbClr>
+          </a:solidFill>
+          <a:ln w="0">
+            <a:solidFill>
+              <a:srgbClr val="3465a4">
+                <a:alpha val="0"/>
+              </a:srgbClr>
+            </a:solidFill>
+          </a:ln>
+        </p:spPr>
+        <p:style>
+          <a:lnRef idx="0"/>
+          <a:fillRef idx="0"/>
+          <a:effectRef idx="0"/>
+          <a:fontRef idx="minor"/>
+        </p:style>
+      </p:sp>
+      <p:pic>
+        <p:nvPicPr>
+          <p:cNvPr id="130" name="" descr=""/>
+          <p:cNvPicPr/>
+          <p:nvPr/>
+        </p:nvPicPr>
+        <p:blipFill>
+          <a:blip r:embed="rId2">
+            <a:lum bright="100000"/>
+          </a:blip>
+          <a:stretch/>
+        </p:blipFill>
+        <p:spPr>
+          <a:xfrm>
+            <a:off x="116640" y="37440"/>
+            <a:ext cx="62280" cy="97200"/>
+          </a:xfrm>
+          <a:prstGeom prst="rect">
+            <a:avLst/>
+          </a:prstGeom>
+          <a:ln w="0">
+            <a:noFill/>
+          </a:ln>
+        </p:spPr>
+      </p:pic>
+      <p:sp>
+        <p:nvSpPr>
+          <p:cNvPr id="131" name=""/>
+          <p:cNvSpPr/>
+          <p:nvPr/>
+        </p:nvSpPr>
+        <p:spPr>
+          <a:xfrm>
+            <a:off x="211680" y="0"/>
+            <a:ext cx="628920" cy="190800"/>
+          </a:xfrm>
+          <a:prstGeom prst="rect">
+            <a:avLst/>
+          </a:prstGeom>
+          <a:noFill/>
+          <a:ln w="0">
+            <a:noFill/>
+          </a:ln>
+        </p:spPr>
+        <p:style>
+          <a:lnRef idx="0"/>
+          <a:fillRef idx="0"/>
+          <a:effectRef idx="0"/>
+          <a:fontRef idx="minor"/>
+        </p:style>
+        <p:txBody>
+          <a:bodyPr lIns="90000" rIns="90000" tIns="45000" bIns="45000">
+            <a:noAutofit/>
+          </a:bodyPr>
+          <a:p>
+            <a:pPr>
+              <a:lnSpc>
+                <a:spcPts val="802"/>
+              </a:lnSpc>
+            </a:pPr>
+            <a:r>
+              <a:rPr b="1" lang="en-US" sz="700" spc="-1" strike="noStrike">
+                <a:solidFill>
+                  <a:srgbClr val="ffffff"/>
+                </a:solidFill>
+                <a:latin typeface="Montserrat"/>
+                <a:ea typeface="DejaVu Sans"/>
+              </a:rPr>
+              <a:t>Desktop</a:t>
+            </a:r>
+            <a:endParaRPr b="0" lang="id-ID" sz="700" spc="-1" strike="noStrike">
+              <a:latin typeface="Arial"/>
+            </a:endParaRPr>
+          </a:p>
+        </p:txBody>
+      </p:sp>
+      <p:sp>
+        <p:nvSpPr>
+          <p:cNvPr id="132" name=""/>
+          <p:cNvSpPr/>
+          <p:nvPr/>
+        </p:nvSpPr>
+        <p:spPr>
+          <a:xfrm>
+            <a:off x="4855320" y="-5400"/>
+            <a:ext cx="368280" cy="190800"/>
           </a:xfrm>
           <a:prstGeom prst="rect">
             <a:avLst/>
@@ -5400,24 +6790,21 @@
               <a:t>7:30</a:t>
             </a:r>
             <a:endParaRPr b="0" lang="id-ID" sz="700" spc="-1" strike="noStrike">
-              <a:solidFill>
-                <a:srgbClr val="ffffff"/>
-              </a:solidFill>
-              <a:latin typeface="Arial"/>
-            </a:endParaRPr>
-          </a:p>
-        </p:txBody>
-      </p:sp>
-      <p:sp>
-        <p:nvSpPr>
-          <p:cNvPr id="114" name=""/>
+              <a:latin typeface="Arial"/>
+            </a:endParaRPr>
+          </a:p>
+        </p:txBody>
+      </p:sp>
+      <p:sp>
+        <p:nvSpPr>
+          <p:cNvPr id="133" name=""/>
           <p:cNvSpPr/>
           <p:nvPr/>
         </p:nvSpPr>
         <p:spPr>
           <a:xfrm>
             <a:off x="9713880" y="42840"/>
-            <a:ext cx="95400" cy="95400"/>
+            <a:ext cx="94680" cy="94680"/>
           </a:xfrm>
           <a:custGeom>
             <a:avLst/>
@@ -5489,14 +6876,14 @@
       </p:sp>
       <p:sp>
         <p:nvSpPr>
-          <p:cNvPr id="115" name=""/>
+          <p:cNvPr id="134" name=""/>
           <p:cNvSpPr/>
           <p:nvPr/>
         </p:nvSpPr>
         <p:spPr>
           <a:xfrm>
             <a:off x="9751680" y="-5400"/>
-            <a:ext cx="376200" cy="191520"/>
+            <a:ext cx="375480" cy="190800"/>
           </a:xfrm>
           <a:prstGeom prst="rect">
             <a:avLst/>
@@ -5533,24 +6920,21 @@
               <a:t>90%</a:t>
             </a:r>
             <a:endParaRPr b="0" lang="id-ID" sz="700" spc="-1" strike="noStrike">
-              <a:solidFill>
-                <a:srgbClr val="ffffff"/>
-              </a:solidFill>
-              <a:latin typeface="Arial"/>
-            </a:endParaRPr>
-          </a:p>
-        </p:txBody>
-      </p:sp>
-      <p:sp>
-        <p:nvSpPr>
-          <p:cNvPr id="116" name=""/>
+              <a:latin typeface="Arial"/>
+            </a:endParaRPr>
+          </a:p>
+        </p:txBody>
+      </p:sp>
+      <p:sp>
+        <p:nvSpPr>
+          <p:cNvPr id="135" name=""/>
           <p:cNvSpPr/>
           <p:nvPr/>
         </p:nvSpPr>
         <p:spPr>
           <a:xfrm>
             <a:off x="9395280" y="-5400"/>
-            <a:ext cx="335520" cy="326520"/>
+            <a:ext cx="334800" cy="325800"/>
           </a:xfrm>
           <a:prstGeom prst="rect">
             <a:avLst/>
@@ -5594,14 +6978,14 @@
       </p:sp>
       <p:sp>
         <p:nvSpPr>
-          <p:cNvPr id="117" name=""/>
+          <p:cNvPr id="136" name=""/>
           <p:cNvSpPr/>
           <p:nvPr/>
         </p:nvSpPr>
         <p:spPr>
           <a:xfrm>
             <a:off x="9229680" y="-5040"/>
-            <a:ext cx="290160" cy="191520"/>
+            <a:ext cx="289440" cy="190800"/>
           </a:xfrm>
           <a:prstGeom prst="rect">
             <a:avLst/>
@@ -5645,14 +7029,14 @@
       </p:sp>
       <p:sp>
         <p:nvSpPr>
-          <p:cNvPr id="118" name=""/>
+          <p:cNvPr id="137" name=""/>
           <p:cNvSpPr/>
           <p:nvPr/>
         </p:nvSpPr>
         <p:spPr>
           <a:xfrm>
             <a:off x="4590360" y="3222000"/>
-            <a:ext cx="847440" cy="359280"/>
+            <a:ext cx="846720" cy="358560"/>
           </a:xfrm>
           <a:custGeom>
             <a:avLst/>
@@ -5708,14 +7092,14 @@
       </p:sp>
       <p:sp>
         <p:nvSpPr>
-          <p:cNvPr id="119" name=""/>
+          <p:cNvPr id="138" name=""/>
           <p:cNvSpPr/>
           <p:nvPr/>
         </p:nvSpPr>
         <p:spPr>
           <a:xfrm>
             <a:off x="4428000" y="3222000"/>
-            <a:ext cx="359640" cy="359640"/>
+            <a:ext cx="358920" cy="358920"/>
           </a:xfrm>
           <a:custGeom>
             <a:avLst/>
@@ -5811,14 +7195,14 @@
       </p:sp>
       <p:sp>
         <p:nvSpPr>
-          <p:cNvPr id="120" name=""/>
+          <p:cNvPr id="139" name=""/>
           <p:cNvSpPr/>
           <p:nvPr/>
         </p:nvSpPr>
         <p:spPr>
           <a:xfrm>
             <a:off x="5256360" y="3222360"/>
-            <a:ext cx="359640" cy="359640"/>
+            <a:ext cx="358920" cy="358920"/>
           </a:xfrm>
           <a:custGeom>
             <a:avLst/>
@@ -5914,14 +7298,14 @@
       </p:sp>
       <p:sp>
         <p:nvSpPr>
-          <p:cNvPr id="121" name=""/>
+          <p:cNvPr id="140" name=""/>
           <p:cNvSpPr/>
           <p:nvPr/>
         </p:nvSpPr>
         <p:spPr>
           <a:xfrm>
             <a:off x="4752000" y="3204360"/>
-            <a:ext cx="539280" cy="363960"/>
+            <a:ext cx="538560" cy="363240"/>
           </a:xfrm>
           <a:prstGeom prst="rect">
             <a:avLst/>
@@ -5965,14 +7349,14 @@
       </p:sp>
       <p:sp>
         <p:nvSpPr>
-          <p:cNvPr id="122" name=""/>
+          <p:cNvPr id="141" name=""/>
           <p:cNvSpPr/>
           <p:nvPr/>
         </p:nvSpPr>
         <p:spPr>
           <a:xfrm rot="612000">
-            <a:off x="5254920" y="3263400"/>
-            <a:ext cx="283680" cy="262800"/>
+            <a:off x="5254920" y="3262680"/>
+            <a:ext cx="282960" cy="262080"/>
           </a:xfrm>
           <a:custGeom>
             <a:avLst/>
@@ -6054,117 +7438,14 @@
       </p:sp>
       <p:sp>
         <p:nvSpPr>
-          <p:cNvPr id="123" name=""/>
+          <p:cNvPr id="142" name=""/>
           <p:cNvSpPr/>
           <p:nvPr/>
         </p:nvSpPr>
         <p:spPr>
           <a:xfrm>
-            <a:off x="3835440" y="3657600"/>
-            <a:ext cx="2382480" cy="2011680"/>
-          </a:xfrm>
-          <a:prstGeom prst="rect">
-            <a:avLst/>
-          </a:prstGeom>
-          <a:solidFill>
-            <a:srgbClr val="008cbf"/>
-          </a:solidFill>
-          <a:ln w="0">
-            <a:solidFill>
-              <a:srgbClr val="3465a4">
-                <a:alpha val="0"/>
-              </a:srgbClr>
-            </a:solidFill>
-          </a:ln>
-        </p:spPr>
-        <p:style>
-          <a:lnRef idx="0"/>
-          <a:fillRef idx="0"/>
-          <a:effectRef idx="0"/>
-          <a:fontRef idx="minor"/>
-        </p:style>
-      </p:sp>
-      <p:sp>
-        <p:nvSpPr>
-          <p:cNvPr id="124" name=""/>
-          <p:cNvSpPr/>
-          <p:nvPr/>
-        </p:nvSpPr>
-        <p:spPr>
-          <a:xfrm>
-            <a:off x="4324320" y="4454280"/>
-            <a:ext cx="1397520" cy="420480"/>
-          </a:xfrm>
-          <a:prstGeom prst="rect">
-            <a:avLst/>
-          </a:prstGeom>
-          <a:noFill/>
-          <a:ln w="0">
-            <a:noFill/>
-          </a:ln>
-        </p:spPr>
-        <p:style>
-          <a:lnRef idx="0"/>
-          <a:fillRef idx="0"/>
-          <a:effectRef idx="0"/>
-          <a:fontRef idx="minor"/>
-        </p:style>
-        <p:txBody>
-          <a:bodyPr lIns="90000" rIns="90000" tIns="45000" bIns="45000">
-            <a:noAutofit/>
-          </a:bodyPr>
-          <a:p>
-            <a:pPr>
-              <a:lnSpc>
-                <a:spcPct val="100000"/>
-              </a:lnSpc>
-            </a:pPr>
-            <a:r>
-              <a:rPr b="0" i="1" lang="id-ID" sz="1800" spc="-1" strike="noStrike">
-                <a:solidFill>
-                  <a:srgbClr val="ffffff"/>
-                </a:solidFill>
-                <a:latin typeface="Arial"/>
-                <a:ea typeface="DejaVu Sans"/>
-              </a:rPr>
-              <a:t>¯\_(</a:t>
-            </a:r>
-            <a:r>
-              <a:rPr b="0" i="1" lang="zh-CN" sz="1800" spc="-1" strike="noStrike">
-                <a:solidFill>
-                  <a:srgbClr val="ffffff"/>
-                </a:solidFill>
-                <a:latin typeface="Arial"/>
-                <a:ea typeface="DejaVu Sans"/>
-              </a:rPr>
-              <a:t>ツ</a:t>
-            </a:r>
-            <a:r>
-              <a:rPr b="0" i="1" lang="id-ID" sz="1800" spc="-1" strike="noStrike">
-                <a:solidFill>
-                  <a:srgbClr val="ffffff"/>
-                </a:solidFill>
-                <a:latin typeface="Arial"/>
-                <a:ea typeface="DejaVu Sans"/>
-              </a:rPr>
-              <a:t>)_/¯</a:t>
-            </a:r>
-            <a:endParaRPr b="0" lang="id-ID" sz="1800" spc="-1" strike="noStrike">
-              <a:latin typeface="Arial"/>
-            </a:endParaRPr>
-          </a:p>
-        </p:txBody>
-      </p:sp>
-      <p:sp>
-        <p:nvSpPr>
-          <p:cNvPr id="125" name=""/>
-          <p:cNvSpPr/>
-          <p:nvPr/>
-        </p:nvSpPr>
-        <p:spPr>
-          <a:xfrm>
             <a:off x="4860000" y="3204360"/>
-            <a:ext cx="359280" cy="363960"/>
+            <a:ext cx="358560" cy="363240"/>
           </a:xfrm>
           <a:prstGeom prst="rect">
             <a:avLst/>
@@ -6208,14 +7489,14 @@
       </p:sp>
       <p:sp>
         <p:nvSpPr>
-          <p:cNvPr id="126" name=""/>
+          <p:cNvPr id="143" name=""/>
           <p:cNvSpPr/>
           <p:nvPr/>
         </p:nvSpPr>
         <p:spPr>
           <a:xfrm rot="597600">
-            <a:off x="4521960" y="3255840"/>
-            <a:ext cx="266040" cy="266040"/>
+            <a:off x="4521240" y="3255840"/>
+            <a:ext cx="265320" cy="265320"/>
           </a:xfrm>
           <a:prstGeom prst="smileyFace">
             <a:avLst>
@@ -6238,6 +7519,484 @@
           <a:effectRef idx="0"/>
           <a:fontRef idx="minor"/>
         </p:style>
+      </p:sp>
+      <p:sp>
+        <p:nvSpPr>
+          <p:cNvPr id="144" name=""/>
+          <p:cNvSpPr/>
+          <p:nvPr/>
+        </p:nvSpPr>
+        <p:spPr>
+          <a:xfrm>
+            <a:off x="3835440" y="3657600"/>
+            <a:ext cx="2381760" cy="2282040"/>
+          </a:xfrm>
+          <a:prstGeom prst="flowChartAlternateProcess">
+            <a:avLst/>
+          </a:prstGeom>
+          <a:solidFill>
+            <a:srgbClr val="008cbf"/>
+          </a:solidFill>
+          <a:ln w="0">
+            <a:solidFill>
+              <a:srgbClr val="3465a4">
+                <a:alpha val="0"/>
+              </a:srgbClr>
+            </a:solidFill>
+          </a:ln>
+        </p:spPr>
+        <p:style>
+          <a:lnRef idx="0"/>
+          <a:fillRef idx="0"/>
+          <a:effectRef idx="0"/>
+          <a:fontRef idx="minor"/>
+        </p:style>
+      </p:sp>
+      <p:sp>
+        <p:nvSpPr>
+          <p:cNvPr id="145" name=""/>
+          <p:cNvSpPr/>
+          <p:nvPr/>
+        </p:nvSpPr>
+        <p:spPr>
+          <a:xfrm>
+            <a:off x="3960000" y="5400000"/>
+            <a:ext cx="179640" cy="179640"/>
+          </a:xfrm>
+          <a:prstGeom prst="smileyFace">
+            <a:avLst>
+              <a:gd name="adj" fmla="val 9282"/>
+            </a:avLst>
+          </a:prstGeom>
+          <a:solidFill>
+            <a:srgbClr val="729fcf"/>
+          </a:solidFill>
+          <a:ln w="0">
+            <a:solidFill>
+              <a:srgbClr val="3465a4"/>
+            </a:solidFill>
+          </a:ln>
+        </p:spPr>
+        <p:style>
+          <a:lnRef idx="0"/>
+          <a:fillRef idx="0"/>
+          <a:effectRef idx="0"/>
+          <a:fontRef idx="minor"/>
+        </p:style>
+      </p:sp>
+      <p:sp>
+        <p:nvSpPr>
+          <p:cNvPr id="146" name=""/>
+          <p:cNvSpPr/>
+          <p:nvPr/>
+        </p:nvSpPr>
+        <p:spPr>
+          <a:xfrm>
+            <a:off x="4104000" y="5360400"/>
+            <a:ext cx="539640" cy="260640"/>
+          </a:xfrm>
+          <a:prstGeom prst="rect">
+            <a:avLst/>
+          </a:prstGeom>
+          <a:noFill/>
+          <a:ln w="0">
+            <a:noFill/>
+          </a:ln>
+        </p:spPr>
+        <p:style>
+          <a:lnRef idx="0"/>
+          <a:fillRef idx="0"/>
+          <a:effectRef idx="0"/>
+          <a:fontRef idx="minor"/>
+        </p:style>
+        <p:txBody>
+          <a:bodyPr lIns="90000" rIns="90000" tIns="45000" bIns="45000">
+            <a:noAutofit/>
+          </a:bodyPr>
+          <a:p>
+            <a:pPr>
+              <a:lnSpc>
+                <a:spcPct val="100000"/>
+              </a:lnSpc>
+            </a:pPr>
+            <a:r>
+              <a:rPr b="0" lang="id-ID" sz="1100" spc="-1" strike="noStrike">
+                <a:solidFill>
+                  <a:srgbClr val="ffffff"/>
+                </a:solidFill>
+                <a:latin typeface="Montserrat"/>
+              </a:rPr>
+              <a:t>User</a:t>
+            </a:r>
+            <a:endParaRPr b="0" lang="id-ID" sz="1100" spc="-1" strike="noStrike">
+              <a:latin typeface="Arial"/>
+            </a:endParaRPr>
+          </a:p>
+        </p:txBody>
+      </p:sp>
+      <p:sp>
+        <p:nvSpPr>
+          <p:cNvPr id="147" name=""/>
+          <p:cNvSpPr/>
+          <p:nvPr/>
+        </p:nvSpPr>
+        <p:spPr>
+          <a:xfrm>
+            <a:off x="5940000" y="5400000"/>
+            <a:ext cx="179640" cy="179640"/>
+          </a:xfrm>
+          <a:custGeom>
+            <a:avLst/>
+            <a:gdLst/>
+            <a:ahLst/>
+            <a:rect l="l" t="t" r="r" b="b"/>
+            <a:pathLst>
+              <a:path w="21600" h="21600">
+                <a:moveTo>
+                  <a:pt x="10800" y="5143"/>
+                </a:moveTo>
+                <a:cubicBezTo>
+                  <a:pt x="7593" y="5143"/>
+                  <a:pt x="5143" y="7593"/>
+                  <a:pt x="5143" y="10800"/>
+                </a:cubicBezTo>
+                <a:cubicBezTo>
+                  <a:pt x="5143" y="14007"/>
+                  <a:pt x="7593" y="16457"/>
+                  <a:pt x="10800" y="16457"/>
+                </a:cubicBezTo>
+                <a:cubicBezTo>
+                  <a:pt x="14007" y="16457"/>
+                  <a:pt x="16457" y="14007"/>
+                  <a:pt x="16457" y="10800"/>
+                </a:cubicBezTo>
+                <a:cubicBezTo>
+                  <a:pt x="16457" y="7593"/>
+                  <a:pt x="14007" y="5143"/>
+                  <a:pt x="10800" y="5143"/>
+                </a:cubicBezTo>
+                <a:close/>
+                <a:moveTo>
+                  <a:pt x="0" y="10800"/>
+                </a:moveTo>
+                <a:cubicBezTo>
+                  <a:pt x="0" y="9159"/>
+                  <a:pt x="1010" y="7827"/>
+                  <a:pt x="2468" y="7371"/>
+                </a:cubicBezTo>
+                <a:cubicBezTo>
+                  <a:pt x="2205" y="6866"/>
+                  <a:pt x="2057" y="6285"/>
+                  <a:pt x="2057" y="5657"/>
+                </a:cubicBezTo>
+                <a:cubicBezTo>
+                  <a:pt x="2057" y="3617"/>
+                  <a:pt x="3616" y="2057"/>
+                  <a:pt x="5657" y="2057"/>
+                </a:cubicBezTo>
+                <a:cubicBezTo>
+                  <a:pt x="6285" y="2057"/>
+                  <a:pt x="6867" y="2206"/>
+                  <a:pt x="7371" y="2468"/>
+                </a:cubicBezTo>
+                <a:cubicBezTo>
+                  <a:pt x="7827" y="1010"/>
+                  <a:pt x="9158" y="0"/>
+                  <a:pt x="10800" y="0"/>
+                </a:cubicBezTo>
+                <a:cubicBezTo>
+                  <a:pt x="12442" y="0"/>
+                  <a:pt x="13773" y="1010"/>
+                  <a:pt x="14229" y="2468"/>
+                </a:cubicBezTo>
+                <a:cubicBezTo>
+                  <a:pt x="14733" y="2206"/>
+                  <a:pt x="15315" y="2057"/>
+                  <a:pt x="15943" y="2057"/>
+                </a:cubicBezTo>
+                <a:cubicBezTo>
+                  <a:pt x="17984" y="2057"/>
+                  <a:pt x="19543" y="3617"/>
+                  <a:pt x="19543" y="5657"/>
+                </a:cubicBezTo>
+                <a:cubicBezTo>
+                  <a:pt x="19543" y="6285"/>
+                  <a:pt x="19395" y="6866"/>
+                  <a:pt x="19132" y="7371"/>
+                </a:cubicBezTo>
+                <a:cubicBezTo>
+                  <a:pt x="20590" y="7827"/>
+                  <a:pt x="21600" y="9159"/>
+                  <a:pt x="21600" y="10800"/>
+                </a:cubicBezTo>
+                <a:cubicBezTo>
+                  <a:pt x="21600" y="12441"/>
+                  <a:pt x="20590" y="13773"/>
+                  <a:pt x="19132" y="14229"/>
+                </a:cubicBezTo>
+                <a:cubicBezTo>
+                  <a:pt x="19395" y="14734"/>
+                  <a:pt x="19543" y="15315"/>
+                  <a:pt x="19543" y="15943"/>
+                </a:cubicBezTo>
+                <a:cubicBezTo>
+                  <a:pt x="19543" y="17983"/>
+                  <a:pt x="17984" y="19543"/>
+                  <a:pt x="15943" y="19543"/>
+                </a:cubicBezTo>
+                <a:cubicBezTo>
+                  <a:pt x="15315" y="19543"/>
+                  <a:pt x="14733" y="19394"/>
+                  <a:pt x="14229" y="19132"/>
+                </a:cubicBezTo>
+                <a:cubicBezTo>
+                  <a:pt x="13773" y="20590"/>
+                  <a:pt x="12442" y="21600"/>
+                  <a:pt x="10800" y="21600"/>
+                </a:cubicBezTo>
+                <a:cubicBezTo>
+                  <a:pt x="9158" y="21600"/>
+                  <a:pt x="7827" y="20590"/>
+                  <a:pt x="7371" y="19132"/>
+                </a:cubicBezTo>
+                <a:cubicBezTo>
+                  <a:pt x="6867" y="19394"/>
+                  <a:pt x="6285" y="19543"/>
+                  <a:pt x="5657" y="19543"/>
+                </a:cubicBezTo>
+                <a:cubicBezTo>
+                  <a:pt x="3616" y="19543"/>
+                  <a:pt x="2057" y="17983"/>
+                  <a:pt x="2057" y="15943"/>
+                </a:cubicBezTo>
+                <a:cubicBezTo>
+                  <a:pt x="2057" y="15315"/>
+                  <a:pt x="2205" y="14734"/>
+                  <a:pt x="2468" y="14229"/>
+                </a:cubicBezTo>
+                <a:cubicBezTo>
+                  <a:pt x="1010" y="13773"/>
+                  <a:pt x="0" y="12441"/>
+                  <a:pt x="0" y="10800"/>
+                </a:cubicBezTo>
+                <a:close/>
+              </a:path>
+            </a:pathLst>
+          </a:custGeom>
+          <a:solidFill>
+            <a:srgbClr val="ffffff"/>
+          </a:solidFill>
+          <a:ln w="0">
+            <a:solidFill>
+              <a:srgbClr val="3465a4">
+                <a:alpha val="0"/>
+              </a:srgbClr>
+            </a:solidFill>
+          </a:ln>
+        </p:spPr>
+        <p:style>
+          <a:lnRef idx="0"/>
+          <a:fillRef idx="0"/>
+          <a:effectRef idx="0"/>
+          <a:fontRef idx="minor"/>
+        </p:style>
+      </p:sp>
+      <p:sp>
+        <p:nvSpPr>
+          <p:cNvPr id="148" name=""/>
+          <p:cNvSpPr/>
+          <p:nvPr/>
+        </p:nvSpPr>
+        <p:spPr>
+          <a:xfrm>
+            <a:off x="3996000" y="3780000"/>
+            <a:ext cx="221760" cy="221760"/>
+          </a:xfrm>
+          <a:prstGeom prst="ellipse">
+            <a:avLst/>
+          </a:prstGeom>
+          <a:solidFill>
+            <a:srgbClr val="ffffff"/>
+          </a:solidFill>
+          <a:ln w="0">
+            <a:solidFill>
+              <a:srgbClr val="3465a4">
+                <a:alpha val="0"/>
+              </a:srgbClr>
+            </a:solidFill>
+          </a:ln>
+        </p:spPr>
+        <p:style>
+          <a:lnRef idx="0"/>
+          <a:fillRef idx="0"/>
+          <a:effectRef idx="0"/>
+          <a:fontRef idx="minor"/>
+        </p:style>
+      </p:sp>
+      <p:sp>
+        <p:nvSpPr>
+          <p:cNvPr id="149" name=""/>
+          <p:cNvSpPr/>
+          <p:nvPr/>
+        </p:nvSpPr>
+        <p:spPr>
+          <a:xfrm>
+            <a:off x="4107240" y="3780000"/>
+            <a:ext cx="1832400" cy="221760"/>
+          </a:xfrm>
+          <a:prstGeom prst="rect">
+            <a:avLst/>
+          </a:prstGeom>
+          <a:solidFill>
+            <a:srgbClr val="ffffff"/>
+          </a:solidFill>
+          <a:ln w="0">
+            <a:solidFill>
+              <a:srgbClr val="3465a4">
+                <a:alpha val="0"/>
+              </a:srgbClr>
+            </a:solidFill>
+          </a:ln>
+        </p:spPr>
+        <p:style>
+          <a:lnRef idx="0"/>
+          <a:fillRef idx="0"/>
+          <a:effectRef idx="0"/>
+          <a:fontRef idx="minor"/>
+        </p:style>
+      </p:sp>
+      <p:sp>
+        <p:nvSpPr>
+          <p:cNvPr id="150" name=""/>
+          <p:cNvSpPr/>
+          <p:nvPr/>
+        </p:nvSpPr>
+        <p:spPr>
+          <a:xfrm>
+            <a:off x="4018320" y="3780000"/>
+            <a:ext cx="1921320" cy="221760"/>
+          </a:xfrm>
+          <a:prstGeom prst="rect">
+            <a:avLst/>
+          </a:prstGeom>
+          <a:noFill/>
+          <a:ln w="0">
+            <a:noFill/>
+          </a:ln>
+        </p:spPr>
+        <p:style>
+          <a:lnRef idx="0"/>
+          <a:fillRef idx="0"/>
+          <a:effectRef idx="0"/>
+          <a:fontRef idx="minor"/>
+        </p:style>
+        <p:txBody>
+          <a:bodyPr lIns="90000" rIns="90000" tIns="45000" bIns="45000">
+            <a:noAutofit/>
+          </a:bodyPr>
+          <a:p>
+            <a:pPr>
+              <a:lnSpc>
+                <a:spcPts val="1287"/>
+              </a:lnSpc>
+            </a:pPr>
+            <a:r>
+              <a:rPr b="0" lang="en-US" sz="1400" spc="-1" strike="noStrike">
+                <a:solidFill>
+                  <a:srgbClr val="b2b2b2"/>
+                </a:solidFill>
+                <a:latin typeface="Montserrat Thin"/>
+                <a:ea typeface="Noto Sans CJK SC"/>
+              </a:rPr>
+              <a:t>Search...</a:t>
+            </a:r>
+            <a:endParaRPr b="0" lang="id-ID" sz="1400" spc="-1" strike="noStrike">
+              <a:latin typeface="Arial"/>
+            </a:endParaRPr>
+          </a:p>
+        </p:txBody>
+      </p:sp>
+      <p:sp>
+        <p:nvSpPr>
+          <p:cNvPr id="151" name=""/>
+          <p:cNvSpPr/>
+          <p:nvPr/>
+        </p:nvSpPr>
+        <p:spPr>
+          <a:xfrm>
+            <a:off x="5825880" y="3780000"/>
+            <a:ext cx="221760" cy="221760"/>
+          </a:xfrm>
+          <a:prstGeom prst="ellipse">
+            <a:avLst/>
+          </a:prstGeom>
+          <a:solidFill>
+            <a:srgbClr val="ffffff"/>
+          </a:solidFill>
+          <a:ln w="0">
+            <a:solidFill>
+              <a:srgbClr val="3465a4">
+                <a:alpha val="0"/>
+              </a:srgbClr>
+            </a:solidFill>
+          </a:ln>
+        </p:spPr>
+        <p:style>
+          <a:lnRef idx="0"/>
+          <a:fillRef idx="0"/>
+          <a:effectRef idx="0"/>
+          <a:fontRef idx="minor"/>
+        </p:style>
+      </p:sp>
+      <p:sp>
+        <p:nvSpPr>
+          <p:cNvPr id="152" name=""/>
+          <p:cNvSpPr/>
+          <p:nvPr/>
+        </p:nvSpPr>
+        <p:spPr>
+          <a:xfrm>
+            <a:off x="3960000" y="4019400"/>
+            <a:ext cx="2087640" cy="300240"/>
+          </a:xfrm>
+          <a:prstGeom prst="rect">
+            <a:avLst/>
+          </a:prstGeom>
+          <a:noFill/>
+          <a:ln w="0">
+            <a:noFill/>
+          </a:ln>
+        </p:spPr>
+        <p:style>
+          <a:lnRef idx="0"/>
+          <a:fillRef idx="0"/>
+          <a:effectRef idx="0"/>
+          <a:fontRef idx="minor"/>
+        </p:style>
+        <p:txBody>
+          <a:bodyPr lIns="90000" rIns="90000" tIns="45000" bIns="45000">
+            <a:noAutofit/>
+          </a:bodyPr>
+          <a:p>
+            <a:pPr algn="ctr">
+              <a:lnSpc>
+                <a:spcPct val="100000"/>
+              </a:lnSpc>
+            </a:pPr>
+            <a:r>
+              <a:rPr b="0" i="1" lang="id-ID" sz="700" spc="-1" strike="noStrike">
+                <a:solidFill>
+                  <a:srgbClr val="ffffff"/>
+                </a:solidFill>
+                <a:latin typeface="Montserrat Thin"/>
+              </a:rPr>
+              <a:t>Do more with the search feature. Try it!</a:t>
+            </a:r>
+            <a:endParaRPr b="0" lang="id-ID" sz="700" spc="-1" strike="noStrike">
+              <a:latin typeface="Arial"/>
+            </a:endParaRPr>
+          </a:p>
+        </p:txBody>
       </p:sp>
     </p:spTree>
   </p:cSld>

</xml_diff>